<commit_message>
Update code to compatible with Micro:bit V2
</commit_message>
<xml_diff>
--- a/1.Preparation before class/1.Online programming/Online programming.pptx
+++ b/1.Preparation before class/1.Online programming/Online programming.pptx
@@ -29,11 +29,11 @@
   <p:notesSz cx="6858000" cy="9144000"/>
   <p:embeddedFontLst>
     <p:embeddedFont>
-      <p:font typeface="微软雅黑" panose="020B0503020204020204" charset="-122"/>
+      <p:font typeface="微软雅黑" charset="-122"/>
       <p:regular r:id="rId21"/>
     </p:embeddedFont>
     <p:embeddedFont>
-      <p:font typeface="微软雅黑 Light" panose="020B0502040204020203" charset="-122"/>
+      <p:font typeface="微软雅黑 Light" charset="-122"/>
       <p:regular r:id="rId22"/>
     </p:embeddedFont>
     <p:embeddedFont>
@@ -41,23 +41,16 @@
       <p:regular r:id="rId23"/>
     </p:embeddedFont>
     <p:embeddedFont>
-      <p:font typeface="Yu Gothic UI Semibold" panose="020B0700000000000000" charset="-128"/>
-      <p:bold r:id="rId24"/>
+      <p:font typeface="Yu Gothic UI Semibold" charset="-128"/>
+      <p:regular r:id="rId24"/>
     </p:embeddedFont>
     <p:embeddedFont>
-      <p:font typeface="方正卡通简体" panose="03000509000000000000" charset="0"/>
+      <p:font typeface="方正喵呜体" charset="0"/>
       <p:regular r:id="rId25"/>
     </p:embeddedFont>
     <p:embeddedFont>
-      <p:font typeface="方正喵呜体" panose="02010600010101010101" charset="0"/>
+      <p:font typeface="方正卡通简体" charset="0"/>
       <p:regular r:id="rId26"/>
-    </p:embeddedFont>
-    <p:embeddedFont>
-      <p:font typeface="Calibri" panose="020F0502020204030204" charset="0"/>
-      <p:regular r:id="rId27"/>
-      <p:bold r:id="rId28"/>
-      <p:italic r:id="rId29"/>
-      <p:boldItalic r:id="rId30"/>
     </p:embeddedFont>
   </p:embeddedFontLst>
   <p:defaultTextStyle>
@@ -4676,7 +4669,7 @@
         <a:spcBef>
           <a:spcPts val="1000"/>
         </a:spcBef>
-        <a:buFont typeface="Arial" panose="020B0604020202020204" pitchFamily="34" charset="0"/>
+        <a:buFont typeface="Arial" pitchFamily="34" charset="0"/>
         <a:buChar char="•"/>
         <a:defRPr sz="2800" kern="1200">
           <a:solidFill>
@@ -4694,7 +4687,7 @@
         <a:spcBef>
           <a:spcPts val="500"/>
         </a:spcBef>
-        <a:buFont typeface="Arial" panose="020B0604020202020204" pitchFamily="34" charset="0"/>
+        <a:buFont typeface="Arial" pitchFamily="34" charset="0"/>
         <a:buChar char="•"/>
         <a:defRPr sz="2400" kern="1200">
           <a:solidFill>
@@ -4712,7 +4705,7 @@
         <a:spcBef>
           <a:spcPts val="500"/>
         </a:spcBef>
-        <a:buFont typeface="Arial" panose="020B0604020202020204" pitchFamily="34" charset="0"/>
+        <a:buFont typeface="Arial" pitchFamily="34" charset="0"/>
         <a:buChar char="•"/>
         <a:defRPr sz="2000" kern="1200">
           <a:solidFill>
@@ -4730,7 +4723,7 @@
         <a:spcBef>
           <a:spcPts val="500"/>
         </a:spcBef>
-        <a:buFont typeface="Arial" panose="020B0604020202020204" pitchFamily="34" charset="0"/>
+        <a:buFont typeface="Arial" pitchFamily="34" charset="0"/>
         <a:buChar char="•"/>
         <a:defRPr sz="1800" kern="1200">
           <a:solidFill>
@@ -4748,7 +4741,7 @@
         <a:spcBef>
           <a:spcPts val="500"/>
         </a:spcBef>
-        <a:buFont typeface="Arial" panose="020B0604020202020204" pitchFamily="34" charset="0"/>
+        <a:buFont typeface="Arial" pitchFamily="34" charset="0"/>
         <a:buChar char="•"/>
         <a:defRPr sz="1800" kern="1200">
           <a:solidFill>
@@ -4766,7 +4759,7 @@
         <a:spcBef>
           <a:spcPts val="500"/>
         </a:spcBef>
-        <a:buFont typeface="Arial" panose="020B0604020202020204" pitchFamily="34" charset="0"/>
+        <a:buFont typeface="Arial" pitchFamily="34" charset="0"/>
         <a:buChar char="•"/>
         <a:defRPr sz="1800" kern="1200">
           <a:solidFill>
@@ -4784,7 +4777,7 @@
         <a:spcBef>
           <a:spcPts val="500"/>
         </a:spcBef>
-        <a:buFont typeface="Arial" panose="020B0604020202020204" pitchFamily="34" charset="0"/>
+        <a:buFont typeface="Arial" pitchFamily="34" charset="0"/>
         <a:buChar char="•"/>
         <a:defRPr sz="1800" kern="1200">
           <a:solidFill>
@@ -4802,7 +4795,7 @@
         <a:spcBef>
           <a:spcPts val="500"/>
         </a:spcBef>
-        <a:buFont typeface="Arial" panose="020B0604020202020204" pitchFamily="34" charset="0"/>
+        <a:buFont typeface="Arial" pitchFamily="34" charset="0"/>
         <a:buChar char="•"/>
         <a:defRPr sz="1800" kern="1200">
           <a:solidFill>
@@ -4820,7 +4813,7 @@
         <a:spcBef>
           <a:spcPts val="500"/>
         </a:spcBef>
-        <a:buFont typeface="Arial" panose="020B0604020202020204" pitchFamily="34" charset="0"/>
+        <a:buFont typeface="Arial" pitchFamily="34" charset="0"/>
         <a:buChar char="•"/>
         <a:defRPr sz="1800" kern="1200">
           <a:solidFill>
@@ -5802,8 +5795,8 @@
                 <a:solidFill>
                   <a:schemeClr val="bg1"/>
                 </a:solidFill>
-                <a:latin typeface="Arial" panose="020B0604020202020204" pitchFamily="34" charset="0"/>
-                <a:ea typeface="Arial" panose="020B0604020202020204" pitchFamily="34" charset="0"/>
+                <a:latin typeface="Arial" pitchFamily="34" charset="0"/>
+                <a:ea typeface="Arial" pitchFamily="34" charset="0"/>
                 <a:sym typeface="+mn-ea"/>
               </a:rPr>
               <a:t> </a:t>
@@ -5813,8 +5806,8 @@
                 <a:solidFill>
                   <a:schemeClr val="bg1"/>
                 </a:solidFill>
-                <a:latin typeface="Arial" panose="020B0604020202020204" pitchFamily="34" charset="0"/>
-                <a:ea typeface="Arial" panose="020B0604020202020204" pitchFamily="34" charset="0"/>
+                <a:latin typeface="Arial" pitchFamily="34" charset="0"/>
+                <a:ea typeface="Arial" pitchFamily="34" charset="0"/>
                 <a:sym typeface="+mn-ea"/>
               </a:rPr>
               <a:t>YahBoom     </a:t>
@@ -5824,8 +5817,8 @@
                 <a:solidFill>
                   <a:schemeClr val="bg1"/>
                 </a:solidFill>
-                <a:latin typeface="微软雅黑" panose="020B0503020204020204" charset="-122"/>
-                <a:ea typeface="微软雅黑" panose="020B0503020204020204" charset="-122"/>
+                <a:latin typeface="微软雅黑" charset="-122"/>
+                <a:ea typeface="微软雅黑" charset="-122"/>
                 <a:sym typeface="+mn-ea"/>
               </a:rPr>
               <a:t>Croco:Kit </a:t>
@@ -5835,8 +5828,8 @@
                 <a:solidFill>
                   <a:schemeClr val="bg1"/>
                 </a:solidFill>
-                <a:latin typeface="Arial" panose="020B0604020202020204" pitchFamily="34" charset="0"/>
-                <a:ea typeface="Arial" panose="020B0604020202020204" pitchFamily="34" charset="0"/>
+                <a:latin typeface="Arial" pitchFamily="34" charset="0"/>
+                <a:ea typeface="Arial" pitchFamily="34" charset="0"/>
                 <a:sym typeface="+mn-ea"/>
               </a:rPr>
               <a:t>tutorial</a:t>
@@ -6131,9 +6124,9 @@
                   <a:schemeClr val="accent1"/>
                 </a:solidFill>
                 <a:effectLst/>
-                <a:latin typeface="Arial" panose="020B0604020202020204" pitchFamily="34" charset="0"/>
-                <a:ea typeface="微软雅黑 Light" panose="020B0502040204020203" charset="-122"/>
-                <a:cs typeface="Arial" panose="020B0604020202020204" pitchFamily="34" charset="0"/>
+                <a:latin typeface="Arial" pitchFamily="34" charset="0"/>
+                <a:ea typeface="微软雅黑 Light" charset="-122"/>
+                <a:cs typeface="Arial" pitchFamily="34" charset="0"/>
               </a:rPr>
               <a:t>Online programming</a:t>
             </a:r>
@@ -6142,9 +6135,9 @@
                 <a:schemeClr val="accent1"/>
               </a:solidFill>
               <a:effectLst/>
-              <a:latin typeface="Arial" panose="020B0604020202020204" pitchFamily="34" charset="0"/>
-              <a:ea typeface="Arial" panose="020B0604020202020204" pitchFamily="34" charset="0"/>
-              <a:cs typeface="Arial" panose="020B0604020202020204" pitchFamily="34" charset="0"/>
+              <a:latin typeface="Arial" pitchFamily="34" charset="0"/>
+              <a:ea typeface="Arial" pitchFamily="34" charset="0"/>
+              <a:cs typeface="Arial" pitchFamily="34" charset="0"/>
             </a:endParaRPr>
           </a:p>
         </p:txBody>
@@ -6184,8 +6177,8 @@
                     </a:srgbClr>
                   </a:outerShdw>
                 </a:effectLst>
-                <a:latin typeface="Arial" panose="020B0604020202020204" pitchFamily="34" charset="0"/>
-                <a:ea typeface="Arial" panose="020B0604020202020204" pitchFamily="34" charset="0"/>
+                <a:latin typeface="Arial" pitchFamily="34" charset="0"/>
+                <a:ea typeface="Arial" pitchFamily="34" charset="0"/>
               </a:rPr>
               <a:t>preparation before class</a:t>
             </a:r>
@@ -6200,8 +6193,8 @@
                   </a:srgbClr>
                 </a:outerShdw>
               </a:effectLst>
-              <a:latin typeface="Arial" panose="020B0604020202020204" pitchFamily="34" charset="0"/>
-              <a:ea typeface="Arial" panose="020B0604020202020204" pitchFamily="34" charset="0"/>
+              <a:latin typeface="Arial" pitchFamily="34" charset="0"/>
+              <a:ea typeface="Arial" pitchFamily="34" charset="0"/>
             </a:endParaRPr>
           </a:p>
         </p:txBody>
@@ -6467,28 +6460,28 @@
                 <a:solidFill>
                   <a:schemeClr val="bg1"/>
                 </a:solidFill>
-                <a:latin typeface="微软雅黑" panose="020B0503020204020204" charset="-122"/>
-                <a:ea typeface="微软雅黑" panose="020B0503020204020204" charset="-122"/>
+                <a:latin typeface="微软雅黑" charset="-122"/>
+                <a:ea typeface="微软雅黑" charset="-122"/>
               </a:rPr>
               <a:t>Preparation before class</a:t>
             </a:r>
             <a:r>
               <a:rPr lang="zh-CN" altLang="en-US" sz="2800" dirty="0">
                 <a:latin typeface="icomoon" charset="0"/>
-                <a:ea typeface="Yu Gothic UI Semibold" panose="020B0700000000000000" charset="-128"/>
+                <a:ea typeface="Yu Gothic UI Semibold" charset="-128"/>
               </a:rPr>
               <a:t>          </a:t>
             </a:r>
             <a:r>
               <a:rPr lang="zh-CN" altLang="en-US" sz="2800" u="sng" dirty="0">
                 <a:latin typeface="icomoon" charset="0"/>
-                <a:ea typeface="Yu Gothic UI Semibold" panose="020B0700000000000000" charset="-128"/>
+                <a:ea typeface="Yu Gothic UI Semibold" charset="-128"/>
               </a:rPr>
               <a:t>                     </a:t>
             </a:r>
             <a:endParaRPr lang="zh-CN" altLang="en-US" sz="2800" u="sng" dirty="0">
               <a:latin typeface="icomoon" charset="0"/>
-              <a:ea typeface="Yu Gothic UI Semibold" panose="020B0700000000000000" charset="-128"/>
+              <a:ea typeface="Yu Gothic UI Semibold" charset="-128"/>
             </a:endParaRPr>
           </a:p>
         </p:txBody>
@@ -6549,8 +6542,8 @@
                     <a:lumMod val="75000"/>
                   </a:schemeClr>
                 </a:solidFill>
-                <a:latin typeface="Arial" panose="020B0604020202020204" pitchFamily="34" charset="0"/>
-                <a:ea typeface="Arial" panose="020B0604020202020204" pitchFamily="34" charset="0"/>
+                <a:latin typeface="Arial" pitchFamily="34" charset="0"/>
+                <a:ea typeface="Arial" pitchFamily="34" charset="0"/>
                 <a:sym typeface="+mn-ea"/>
               </a:rPr>
               <a:t>Part 3</a:t>
@@ -6561,8 +6554,8 @@
                   <a:lumMod val="75000"/>
                 </a:schemeClr>
               </a:solidFill>
-              <a:latin typeface="Arial" panose="020B0604020202020204" pitchFamily="34" charset="0"/>
-              <a:ea typeface="Arial" panose="020B0604020202020204" pitchFamily="34" charset="0"/>
+              <a:latin typeface="Arial" pitchFamily="34" charset="0"/>
+              <a:ea typeface="Arial" pitchFamily="34" charset="0"/>
               <a:sym typeface="+mn-ea"/>
             </a:endParaRPr>
           </a:p>
@@ -6824,8 +6817,8 @@
                     </a:srgbClr>
                   </a:outerShdw>
                 </a:effectLst>
-                <a:latin typeface="Arial" panose="020B0604020202020204" pitchFamily="34" charset="0"/>
-                <a:ea typeface="Arial" panose="020B0604020202020204" pitchFamily="34" charset="0"/>
+                <a:latin typeface="Arial" pitchFamily="34" charset="0"/>
+                <a:ea typeface="Arial" pitchFamily="34" charset="0"/>
               </a:rPr>
               <a:t> </a:t>
             </a:r>
@@ -6841,8 +6834,8 @@
                     </a:srgbClr>
                   </a:outerShdw>
                 </a:effectLst>
-                <a:latin typeface="Arial" panose="020B0604020202020204" pitchFamily="34" charset="0"/>
-                <a:ea typeface="Arial" panose="020B0604020202020204" pitchFamily="34" charset="0"/>
+                <a:latin typeface="Arial" pitchFamily="34" charset="0"/>
+                <a:ea typeface="Arial" pitchFamily="34" charset="0"/>
               </a:rPr>
               <a:t>C</a:t>
             </a:r>
@@ -6858,8 +6851,8 @@
                     </a:srgbClr>
                   </a:outerShdw>
                 </a:effectLst>
-                <a:latin typeface="Arial" panose="020B0604020202020204" pitchFamily="34" charset="0"/>
-                <a:ea typeface="Arial" panose="020B0604020202020204" pitchFamily="34" charset="0"/>
+                <a:latin typeface="Arial" pitchFamily="34" charset="0"/>
+                <a:ea typeface="Arial" pitchFamily="34" charset="0"/>
               </a:rPr>
               <a:t>lick </a:t>
             </a:r>
@@ -6875,8 +6868,8 @@
                     </a:srgbClr>
                   </a:outerShdw>
                 </a:effectLst>
-                <a:latin typeface="Arial" panose="020B0604020202020204" pitchFamily="34" charset="0"/>
-                <a:ea typeface="Arial" panose="020B0604020202020204" pitchFamily="34" charset="0"/>
+                <a:latin typeface="Arial" pitchFamily="34" charset="0"/>
+                <a:ea typeface="Arial" pitchFamily="34" charset="0"/>
               </a:rPr>
               <a:t>”Croco-kit”</a:t>
             </a:r>
@@ -6892,8 +6885,8 @@
                     </a:srgbClr>
                   </a:outerShdw>
                 </a:effectLst>
-                <a:latin typeface="Arial" panose="020B0604020202020204" pitchFamily="34" charset="0"/>
-                <a:ea typeface="Arial" panose="020B0604020202020204" pitchFamily="34" charset="0"/>
+                <a:latin typeface="Arial" pitchFamily="34" charset="0"/>
+                <a:ea typeface="Arial" pitchFamily="34" charset="0"/>
               </a:rPr>
               <a:t>, and you can add the package successfully.</a:t>
             </a:r>
@@ -6908,8 +6901,8 @@
                   </a:srgbClr>
                 </a:outerShdw>
               </a:effectLst>
-              <a:latin typeface="Arial" panose="020B0604020202020204" pitchFamily="34" charset="0"/>
-              <a:ea typeface="Arial" panose="020B0604020202020204" pitchFamily="34" charset="0"/>
+              <a:latin typeface="Arial" pitchFamily="34" charset="0"/>
+              <a:ea typeface="Arial" pitchFamily="34" charset="0"/>
             </a:endParaRPr>
           </a:p>
         </p:txBody>
@@ -7309,8 +7302,8 @@
                 <a:solidFill>
                   <a:schemeClr val="bg1"/>
                 </a:solidFill>
-                <a:latin typeface="Arial" panose="020B0604020202020204" pitchFamily="34" charset="0"/>
-                <a:ea typeface="Arial" panose="020B0604020202020204" pitchFamily="34" charset="0"/>
+                <a:latin typeface="Arial" pitchFamily="34" charset="0"/>
+                <a:ea typeface="Arial" pitchFamily="34" charset="0"/>
                 <a:sym typeface="+mn-ea"/>
               </a:rPr>
               <a:t> </a:t>
@@ -7320,8 +7313,8 @@
                 <a:solidFill>
                   <a:schemeClr val="bg1"/>
                 </a:solidFill>
-                <a:latin typeface="Arial" panose="020B0604020202020204" pitchFamily="34" charset="0"/>
-                <a:ea typeface="Arial" panose="020B0604020202020204" pitchFamily="34" charset="0"/>
+                <a:latin typeface="Arial" pitchFamily="34" charset="0"/>
+                <a:ea typeface="Arial" pitchFamily="34" charset="0"/>
                 <a:sym typeface="+mn-ea"/>
               </a:rPr>
               <a:t>YahBoom     </a:t>
@@ -7331,8 +7324,8 @@
                 <a:solidFill>
                   <a:schemeClr val="bg1"/>
                 </a:solidFill>
-                <a:latin typeface="微软雅黑" panose="020B0503020204020204" charset="-122"/>
-                <a:ea typeface="微软雅黑" panose="020B0503020204020204" charset="-122"/>
+                <a:latin typeface="微软雅黑" charset="-122"/>
+                <a:ea typeface="微软雅黑" charset="-122"/>
                 <a:sym typeface="+mn-ea"/>
               </a:rPr>
               <a:t>Croco:Kit </a:t>
@@ -7342,8 +7335,8 @@
                 <a:solidFill>
                   <a:schemeClr val="bg1"/>
                 </a:solidFill>
-                <a:latin typeface="Arial" panose="020B0604020202020204" pitchFamily="34" charset="0"/>
-                <a:ea typeface="Arial" panose="020B0604020202020204" pitchFamily="34" charset="0"/>
+                <a:latin typeface="Arial" pitchFamily="34" charset="0"/>
+                <a:ea typeface="Arial" pitchFamily="34" charset="0"/>
                 <a:sym typeface="+mn-ea"/>
               </a:rPr>
               <a:t>tutorial</a:t>
@@ -7380,8 +7373,8 @@
                     <a:lumMod val="75000"/>
                   </a:schemeClr>
                 </a:solidFill>
-                <a:latin typeface="Arial" panose="020B0604020202020204" pitchFamily="34" charset="0"/>
-                <a:ea typeface="Arial" panose="020B0604020202020204" pitchFamily="34" charset="0"/>
+                <a:latin typeface="Arial" pitchFamily="34" charset="0"/>
+                <a:ea typeface="Arial" pitchFamily="34" charset="0"/>
                 <a:sym typeface="+mn-ea"/>
               </a:rPr>
               <a:t>How to add YahBoom extension</a:t>
@@ -7393,8 +7386,8 @@
                     <a:lumMod val="75000"/>
                   </a:schemeClr>
                 </a:solidFill>
-                <a:latin typeface="Arial" panose="020B0604020202020204" pitchFamily="34" charset="0"/>
-                <a:ea typeface="Arial" panose="020B0604020202020204" pitchFamily="34" charset="0"/>
+                <a:latin typeface="Arial" pitchFamily="34" charset="0"/>
+                <a:ea typeface="Arial" pitchFamily="34" charset="0"/>
                 <a:sym typeface="+mn-ea"/>
               </a:rPr>
               <a:t> </a:t>
@@ -7405,8 +7398,8 @@
                   <a:lumMod val="75000"/>
                 </a:schemeClr>
               </a:solidFill>
-              <a:latin typeface="Arial" panose="020B0604020202020204" pitchFamily="34" charset="0"/>
-              <a:ea typeface="Arial" panose="020B0604020202020204" pitchFamily="34" charset="0"/>
+              <a:latin typeface="Arial" pitchFamily="34" charset="0"/>
+              <a:ea typeface="Arial" pitchFamily="34" charset="0"/>
               <a:sym typeface="+mn-ea"/>
             </a:endParaRPr>
           </a:p>
@@ -7449,28 +7442,28 @@
                 <a:solidFill>
                   <a:schemeClr val="bg1"/>
                 </a:solidFill>
-                <a:latin typeface="微软雅黑" panose="020B0503020204020204" charset="-122"/>
-                <a:ea typeface="微软雅黑" panose="020B0503020204020204" charset="-122"/>
+                <a:latin typeface="微软雅黑" charset="-122"/>
+                <a:ea typeface="微软雅黑" charset="-122"/>
               </a:rPr>
               <a:t>Preparation before class</a:t>
             </a:r>
             <a:r>
               <a:rPr lang="zh-CN" altLang="en-US" sz="2800" dirty="0">
                 <a:latin typeface="icomoon" charset="0"/>
-                <a:ea typeface="Yu Gothic UI Semibold" panose="020B0700000000000000" charset="-128"/>
+                <a:ea typeface="Yu Gothic UI Semibold" charset="-128"/>
               </a:rPr>
               <a:t>          </a:t>
             </a:r>
             <a:r>
               <a:rPr lang="zh-CN" altLang="en-US" sz="2800" u="sng" dirty="0">
                 <a:latin typeface="icomoon" charset="0"/>
-                <a:ea typeface="Yu Gothic UI Semibold" panose="020B0700000000000000" charset="-128"/>
+                <a:ea typeface="Yu Gothic UI Semibold" charset="-128"/>
               </a:rPr>
               <a:t>                     </a:t>
             </a:r>
             <a:endParaRPr lang="zh-CN" altLang="en-US" sz="2800" u="sng" dirty="0">
               <a:latin typeface="icomoon" charset="0"/>
-              <a:ea typeface="Yu Gothic UI Semibold" panose="020B0700000000000000" charset="-128"/>
+              <a:ea typeface="Yu Gothic UI Semibold" charset="-128"/>
             </a:endParaRPr>
           </a:p>
         </p:txBody>
@@ -7994,8 +7987,8 @@
                     <a:lumMod val="75000"/>
                   </a:schemeClr>
                 </a:solidFill>
-                <a:latin typeface="Arial" panose="020B0604020202020204" pitchFamily="34" charset="0"/>
-                <a:ea typeface="Arial" panose="020B0604020202020204" pitchFamily="34" charset="0"/>
+                <a:latin typeface="Arial" pitchFamily="34" charset="0"/>
+                <a:ea typeface="Arial" pitchFamily="34" charset="0"/>
                 <a:sym typeface="+mn-ea"/>
               </a:rPr>
               <a:t>Part 3</a:t>
@@ -8006,8 +7999,8 @@
                   <a:lumMod val="75000"/>
                 </a:schemeClr>
               </a:solidFill>
-              <a:latin typeface="Arial" panose="020B0604020202020204" pitchFamily="34" charset="0"/>
-              <a:ea typeface="Arial" panose="020B0604020202020204" pitchFamily="34" charset="0"/>
+              <a:latin typeface="Arial" pitchFamily="34" charset="0"/>
+              <a:ea typeface="Arial" pitchFamily="34" charset="0"/>
               <a:sym typeface="+mn-ea"/>
             </a:endParaRPr>
           </a:p>
@@ -8408,8 +8401,8 @@
                 <a:solidFill>
                   <a:schemeClr val="bg1"/>
                 </a:solidFill>
-                <a:latin typeface="Arial" panose="020B0604020202020204" pitchFamily="34" charset="0"/>
-                <a:ea typeface="Arial" panose="020B0604020202020204" pitchFamily="34" charset="0"/>
+                <a:latin typeface="Arial" pitchFamily="34" charset="0"/>
+                <a:ea typeface="Arial" pitchFamily="34" charset="0"/>
                 <a:sym typeface="+mn-ea"/>
               </a:rPr>
               <a:t> </a:t>
@@ -8419,8 +8412,8 @@
                 <a:solidFill>
                   <a:schemeClr val="bg1"/>
                 </a:solidFill>
-                <a:latin typeface="Arial" panose="020B0604020202020204" pitchFamily="34" charset="0"/>
-                <a:ea typeface="Arial" panose="020B0604020202020204" pitchFamily="34" charset="0"/>
+                <a:latin typeface="Arial" pitchFamily="34" charset="0"/>
+                <a:ea typeface="Arial" pitchFamily="34" charset="0"/>
                 <a:sym typeface="+mn-ea"/>
               </a:rPr>
               <a:t>YahBoom     </a:t>
@@ -8430,8 +8423,8 @@
                 <a:solidFill>
                   <a:schemeClr val="bg1"/>
                 </a:solidFill>
-                <a:latin typeface="微软雅黑" panose="020B0503020204020204" charset="-122"/>
-                <a:ea typeface="微软雅黑" panose="020B0503020204020204" charset="-122"/>
+                <a:latin typeface="微软雅黑" charset="-122"/>
+                <a:ea typeface="微软雅黑" charset="-122"/>
                 <a:sym typeface="+mn-ea"/>
               </a:rPr>
               <a:t>Croco:Kit </a:t>
@@ -8441,8 +8434,8 @@
                 <a:solidFill>
                   <a:schemeClr val="bg1"/>
                 </a:solidFill>
-                <a:latin typeface="Arial" panose="020B0604020202020204" pitchFamily="34" charset="0"/>
-                <a:ea typeface="Arial" panose="020B0604020202020204" pitchFamily="34" charset="0"/>
+                <a:latin typeface="Arial" pitchFamily="34" charset="0"/>
+                <a:ea typeface="Arial" pitchFamily="34" charset="0"/>
                 <a:sym typeface="+mn-ea"/>
               </a:rPr>
               <a:t>tutorial</a:t>
@@ -8485,8 +8478,8 @@
                     </a:srgbClr>
                   </a:outerShdw>
                 </a:effectLst>
-                <a:latin typeface="Arial" panose="020B0604020202020204" pitchFamily="34" charset="0"/>
-                <a:ea typeface="Arial" panose="020B0604020202020204" pitchFamily="34" charset="0"/>
+                <a:latin typeface="Arial" pitchFamily="34" charset="0"/>
+                <a:ea typeface="Arial" pitchFamily="34" charset="0"/>
                 <a:sym typeface="+mn-ea"/>
               </a:rPr>
               <a:t>After loading the package, we can see that the program bar has loaded the blocks made by YahBoom.</a:t>
@@ -8502,8 +8495,8 @@
                   </a:srgbClr>
                 </a:outerShdw>
               </a:effectLst>
-              <a:latin typeface="Arial" panose="020B0604020202020204" pitchFamily="34" charset="0"/>
-              <a:ea typeface="Arial" panose="020B0604020202020204" pitchFamily="34" charset="0"/>
+              <a:latin typeface="Arial" pitchFamily="34" charset="0"/>
+              <a:ea typeface="Arial" pitchFamily="34" charset="0"/>
               <a:sym typeface="+mn-ea"/>
             </a:endParaRPr>
           </a:p>
@@ -8537,8 +8530,8 @@
                     <a:lumMod val="75000"/>
                   </a:schemeClr>
                 </a:solidFill>
-                <a:latin typeface="Arial" panose="020B0604020202020204" pitchFamily="34" charset="0"/>
-                <a:ea typeface="Arial" panose="020B0604020202020204" pitchFamily="34" charset="0"/>
+                <a:latin typeface="Arial" pitchFamily="34" charset="0"/>
+                <a:ea typeface="Arial" pitchFamily="34" charset="0"/>
                 <a:sym typeface="+mn-ea"/>
               </a:rPr>
               <a:t>How to add YahBoom extension</a:t>
@@ -8550,8 +8543,8 @@
                     <a:lumMod val="75000"/>
                   </a:schemeClr>
                 </a:solidFill>
-                <a:latin typeface="Arial" panose="020B0604020202020204" pitchFamily="34" charset="0"/>
-                <a:ea typeface="Arial" panose="020B0604020202020204" pitchFamily="34" charset="0"/>
+                <a:latin typeface="Arial" pitchFamily="34" charset="0"/>
+                <a:ea typeface="Arial" pitchFamily="34" charset="0"/>
                 <a:sym typeface="+mn-ea"/>
               </a:rPr>
               <a:t> </a:t>
@@ -8562,8 +8555,8 @@
                   <a:lumMod val="75000"/>
                 </a:schemeClr>
               </a:solidFill>
-              <a:latin typeface="Arial" panose="020B0604020202020204" pitchFamily="34" charset="0"/>
-              <a:ea typeface="Arial" panose="020B0604020202020204" pitchFamily="34" charset="0"/>
+              <a:latin typeface="Arial" pitchFamily="34" charset="0"/>
+              <a:ea typeface="Arial" pitchFamily="34" charset="0"/>
               <a:sym typeface="+mn-ea"/>
             </a:endParaRPr>
           </a:p>
@@ -8606,28 +8599,28 @@
                 <a:solidFill>
                   <a:schemeClr val="bg1"/>
                 </a:solidFill>
-                <a:latin typeface="微软雅黑" panose="020B0503020204020204" charset="-122"/>
-                <a:ea typeface="微软雅黑" panose="020B0503020204020204" charset="-122"/>
+                <a:latin typeface="微软雅黑" charset="-122"/>
+                <a:ea typeface="微软雅黑" charset="-122"/>
               </a:rPr>
               <a:t>Preparation before class</a:t>
             </a:r>
             <a:r>
               <a:rPr lang="zh-CN" altLang="en-US" sz="2800" dirty="0">
                 <a:latin typeface="icomoon" charset="0"/>
-                <a:ea typeface="Yu Gothic UI Semibold" panose="020B0700000000000000" charset="-128"/>
+                <a:ea typeface="Yu Gothic UI Semibold" charset="-128"/>
               </a:rPr>
               <a:t>          </a:t>
             </a:r>
             <a:r>
               <a:rPr lang="zh-CN" altLang="en-US" sz="2800" u="sng" dirty="0">
                 <a:latin typeface="icomoon" charset="0"/>
-                <a:ea typeface="Yu Gothic UI Semibold" panose="020B0700000000000000" charset="-128"/>
+                <a:ea typeface="Yu Gothic UI Semibold" charset="-128"/>
               </a:rPr>
               <a:t>                     </a:t>
             </a:r>
             <a:endParaRPr lang="zh-CN" altLang="en-US" sz="2800" u="sng" dirty="0">
               <a:latin typeface="icomoon" charset="0"/>
-              <a:ea typeface="Yu Gothic UI Semibold" panose="020B0700000000000000" charset="-128"/>
+              <a:ea typeface="Yu Gothic UI Semibold" charset="-128"/>
             </a:endParaRPr>
           </a:p>
         </p:txBody>
@@ -8702,8 +8695,8 @@
                     <a:lumMod val="75000"/>
                   </a:schemeClr>
                 </a:solidFill>
-                <a:latin typeface="Arial" panose="020B0604020202020204" pitchFamily="34" charset="0"/>
-                <a:ea typeface="Arial" panose="020B0604020202020204" pitchFamily="34" charset="0"/>
+                <a:latin typeface="Arial" pitchFamily="34" charset="0"/>
+                <a:ea typeface="Arial" pitchFamily="34" charset="0"/>
                 <a:sym typeface="+mn-ea"/>
               </a:rPr>
               <a:t>Part 4</a:t>
@@ -8714,8 +8707,8 @@
                   <a:lumMod val="75000"/>
                 </a:schemeClr>
               </a:solidFill>
-              <a:latin typeface="Arial" panose="020B0604020202020204" pitchFamily="34" charset="0"/>
-              <a:ea typeface="Arial" panose="020B0604020202020204" pitchFamily="34" charset="0"/>
+              <a:latin typeface="Arial" pitchFamily="34" charset="0"/>
+              <a:ea typeface="Arial" pitchFamily="34" charset="0"/>
               <a:sym typeface="+mn-ea"/>
             </a:endParaRPr>
           </a:p>
@@ -8972,8 +8965,8 @@
                     <a:lumMod val="75000"/>
                   </a:schemeClr>
                 </a:solidFill>
-                <a:latin typeface="Arial" panose="020B0604020202020204" pitchFamily="34" charset="0"/>
-                <a:ea typeface="Arial" panose="020B0604020202020204" pitchFamily="34" charset="0"/>
+                <a:latin typeface="Arial" pitchFamily="34" charset="0"/>
+                <a:ea typeface="Arial" pitchFamily="34" charset="0"/>
                 <a:sym typeface="+mn-ea"/>
               </a:rPr>
               <a:t>How to download </a:t>
@@ -8984,8 +8977,8 @@
                   <a:lumMod val="75000"/>
                 </a:schemeClr>
               </a:solidFill>
-              <a:latin typeface="Arial" panose="020B0604020202020204" pitchFamily="34" charset="0"/>
-              <a:ea typeface="Arial" panose="020B0604020202020204" pitchFamily="34" charset="0"/>
+              <a:latin typeface="Arial" pitchFamily="34" charset="0"/>
+              <a:ea typeface="Arial" pitchFamily="34" charset="0"/>
               <a:sym typeface="+mn-ea"/>
             </a:endParaRPr>
           </a:p>
@@ -8997,8 +8990,8 @@
                     <a:lumMod val="75000"/>
                   </a:schemeClr>
                 </a:solidFill>
-                <a:latin typeface="Arial" panose="020B0604020202020204" pitchFamily="34" charset="0"/>
-                <a:ea typeface="Arial" panose="020B0604020202020204" pitchFamily="34" charset="0"/>
+                <a:latin typeface="Arial" pitchFamily="34" charset="0"/>
+                <a:ea typeface="Arial" pitchFamily="34" charset="0"/>
                 <a:sym typeface="+mn-ea"/>
               </a:rPr>
               <a:t>micro:bit</a:t>
@@ -9010,8 +9003,8 @@
                     <a:lumMod val="75000"/>
                   </a:schemeClr>
                 </a:solidFill>
-                <a:latin typeface="Arial" panose="020B0604020202020204" pitchFamily="34" charset="0"/>
-                <a:ea typeface="Arial" panose="020B0604020202020204" pitchFamily="34" charset="0"/>
+                <a:latin typeface="Arial" pitchFamily="34" charset="0"/>
+                <a:ea typeface="Arial" pitchFamily="34" charset="0"/>
                 <a:sym typeface="+mn-ea"/>
               </a:rPr>
               <a:t> </a:t>
@@ -9023,8 +9016,8 @@
                     <a:lumMod val="75000"/>
                   </a:schemeClr>
                 </a:solidFill>
-                <a:latin typeface="Arial" panose="020B0604020202020204" pitchFamily="34" charset="0"/>
-                <a:ea typeface="Arial" panose="020B0604020202020204" pitchFamily="34" charset="0"/>
+                <a:latin typeface="Arial" pitchFamily="34" charset="0"/>
+                <a:ea typeface="Arial" pitchFamily="34" charset="0"/>
                 <a:sym typeface="+mn-ea"/>
               </a:rPr>
               <a:t>code?</a:t>
@@ -9035,8 +9028,8 @@
                   <a:lumMod val="75000"/>
                 </a:schemeClr>
               </a:solidFill>
-              <a:latin typeface="Arial" panose="020B0604020202020204" pitchFamily="34" charset="0"/>
-              <a:ea typeface="Arial" panose="020B0604020202020204" pitchFamily="34" charset="0"/>
+              <a:latin typeface="Arial" pitchFamily="34" charset="0"/>
+              <a:ea typeface="Arial" pitchFamily="34" charset="0"/>
               <a:sym typeface="+mn-ea"/>
             </a:endParaRPr>
           </a:p>
@@ -9075,8 +9068,8 @@
                     </a:srgbClr>
                   </a:outerShdw>
                 </a:effectLst>
-                <a:latin typeface="Arial" panose="020B0604020202020204" pitchFamily="34" charset="0"/>
-                <a:ea typeface="Arial" panose="020B0604020202020204" pitchFamily="34" charset="0"/>
+                <a:latin typeface="Arial" pitchFamily="34" charset="0"/>
+                <a:ea typeface="Arial" pitchFamily="34" charset="0"/>
               </a:rPr>
               <a:t> </a:t>
             </a:r>
@@ -9092,8 +9085,8 @@
                     </a:srgbClr>
                   </a:outerShdw>
                 </a:effectLst>
-                <a:latin typeface="Arial" panose="020B0604020202020204" pitchFamily="34" charset="0"/>
-                <a:ea typeface="Arial" panose="020B0604020202020204" pitchFamily="34" charset="0"/>
+                <a:latin typeface="Arial" pitchFamily="34" charset="0"/>
+                <a:ea typeface="Arial" pitchFamily="34" charset="0"/>
               </a:rPr>
               <a:t>After the building blocks</a:t>
             </a:r>
@@ -9109,8 +9102,8 @@
                     </a:srgbClr>
                   </a:outerShdw>
                 </a:effectLst>
-                <a:latin typeface="Arial" panose="020B0604020202020204" pitchFamily="34" charset="0"/>
-                <a:ea typeface="Arial" panose="020B0604020202020204" pitchFamily="34" charset="0"/>
+                <a:latin typeface="Arial" pitchFamily="34" charset="0"/>
+                <a:ea typeface="Arial" pitchFamily="34" charset="0"/>
               </a:rPr>
               <a:t>, click Download. </a:t>
             </a:r>
@@ -9126,8 +9119,8 @@
                     </a:srgbClr>
                   </a:outerShdw>
                 </a:effectLst>
-                <a:latin typeface="Arial" panose="020B0604020202020204" pitchFamily="34" charset="0"/>
-                <a:ea typeface="Arial" panose="020B0604020202020204" pitchFamily="34" charset="0"/>
+                <a:latin typeface="Arial" pitchFamily="34" charset="0"/>
+                <a:ea typeface="Arial" pitchFamily="34" charset="0"/>
               </a:rPr>
               <a:t>You can set the download path in the U disk of micro:bit, download it to the computer, and then copy it </a:t>
             </a:r>
@@ -9143,8 +9136,8 @@
                     </a:srgbClr>
                   </a:outerShdw>
                 </a:effectLst>
-                <a:latin typeface="Arial" panose="020B0604020202020204" pitchFamily="34" charset="0"/>
-                <a:ea typeface="Arial" panose="020B0604020202020204" pitchFamily="34" charset="0"/>
+                <a:latin typeface="Arial" pitchFamily="34" charset="0"/>
+                <a:ea typeface="Arial" pitchFamily="34" charset="0"/>
               </a:rPr>
               <a:t>or send it </a:t>
             </a:r>
@@ -9160,8 +9153,8 @@
                     </a:srgbClr>
                   </a:outerShdw>
                 </a:effectLst>
-                <a:latin typeface="Arial" panose="020B0604020202020204" pitchFamily="34" charset="0"/>
-                <a:ea typeface="Arial" panose="020B0604020202020204" pitchFamily="34" charset="0"/>
+                <a:latin typeface="Arial" pitchFamily="34" charset="0"/>
+                <a:ea typeface="Arial" pitchFamily="34" charset="0"/>
               </a:rPr>
               <a:t>to the U disk in micro:bit.</a:t>
             </a:r>
@@ -9176,8 +9169,8 @@
                   </a:srgbClr>
                 </a:outerShdw>
               </a:effectLst>
-              <a:latin typeface="Arial" panose="020B0604020202020204" pitchFamily="34" charset="0"/>
-              <a:ea typeface="Arial" panose="020B0604020202020204" pitchFamily="34" charset="0"/>
+              <a:latin typeface="Arial" pitchFamily="34" charset="0"/>
+              <a:ea typeface="Arial" pitchFamily="34" charset="0"/>
             </a:endParaRPr>
           </a:p>
         </p:txBody>
@@ -9577,8 +9570,8 @@
                 <a:solidFill>
                   <a:schemeClr val="bg1"/>
                 </a:solidFill>
-                <a:latin typeface="Arial" panose="020B0604020202020204" pitchFamily="34" charset="0"/>
-                <a:ea typeface="Arial" panose="020B0604020202020204" pitchFamily="34" charset="0"/>
+                <a:latin typeface="Arial" pitchFamily="34" charset="0"/>
+                <a:ea typeface="Arial" pitchFamily="34" charset="0"/>
                 <a:sym typeface="+mn-ea"/>
               </a:rPr>
               <a:t> </a:t>
@@ -9588,8 +9581,8 @@
                 <a:solidFill>
                   <a:schemeClr val="bg1"/>
                 </a:solidFill>
-                <a:latin typeface="Arial" panose="020B0604020202020204" pitchFamily="34" charset="0"/>
-                <a:ea typeface="Arial" panose="020B0604020202020204" pitchFamily="34" charset="0"/>
+                <a:latin typeface="Arial" pitchFamily="34" charset="0"/>
+                <a:ea typeface="Arial" pitchFamily="34" charset="0"/>
                 <a:sym typeface="+mn-ea"/>
               </a:rPr>
               <a:t>YahBoom     </a:t>
@@ -9599,8 +9592,8 @@
                 <a:solidFill>
                   <a:schemeClr val="bg1"/>
                 </a:solidFill>
-                <a:latin typeface="微软雅黑" panose="020B0503020204020204" charset="-122"/>
-                <a:ea typeface="微软雅黑" panose="020B0503020204020204" charset="-122"/>
+                <a:latin typeface="微软雅黑" charset="-122"/>
+                <a:ea typeface="微软雅黑" charset="-122"/>
                 <a:sym typeface="+mn-ea"/>
               </a:rPr>
               <a:t>Croco:Kit </a:t>
@@ -9610,8 +9603,8 @@
                 <a:solidFill>
                   <a:schemeClr val="bg1"/>
                 </a:solidFill>
-                <a:latin typeface="Arial" panose="020B0604020202020204" pitchFamily="34" charset="0"/>
-                <a:ea typeface="Arial" panose="020B0604020202020204" pitchFamily="34" charset="0"/>
+                <a:latin typeface="Arial" pitchFamily="34" charset="0"/>
+                <a:ea typeface="Arial" pitchFamily="34" charset="0"/>
                 <a:sym typeface="+mn-ea"/>
               </a:rPr>
               <a:t>tutorial</a:t>
@@ -9657,28 +9650,28 @@
                 <a:solidFill>
                   <a:schemeClr val="bg1"/>
                 </a:solidFill>
-                <a:latin typeface="微软雅黑" panose="020B0503020204020204" charset="-122"/>
-                <a:ea typeface="微软雅黑" panose="020B0503020204020204" charset="-122"/>
+                <a:latin typeface="微软雅黑" charset="-122"/>
+                <a:ea typeface="微软雅黑" charset="-122"/>
               </a:rPr>
               <a:t>Preparation before class</a:t>
             </a:r>
             <a:r>
               <a:rPr lang="zh-CN" altLang="en-US" sz="2800" dirty="0">
                 <a:latin typeface="icomoon" charset="0"/>
-                <a:ea typeface="Yu Gothic UI Semibold" panose="020B0700000000000000" charset="-128"/>
+                <a:ea typeface="Yu Gothic UI Semibold" charset="-128"/>
               </a:rPr>
               <a:t>          </a:t>
             </a:r>
             <a:r>
               <a:rPr lang="zh-CN" altLang="en-US" sz="2800" u="sng" dirty="0">
                 <a:latin typeface="icomoon" charset="0"/>
-                <a:ea typeface="Yu Gothic UI Semibold" panose="020B0700000000000000" charset="-128"/>
+                <a:ea typeface="Yu Gothic UI Semibold" charset="-128"/>
               </a:rPr>
               <a:t>                     </a:t>
             </a:r>
             <a:endParaRPr lang="zh-CN" altLang="en-US" sz="2800" u="sng" dirty="0">
               <a:latin typeface="icomoon" charset="0"/>
-              <a:ea typeface="Yu Gothic UI Semibold" panose="020B0700000000000000" charset="-128"/>
+              <a:ea typeface="Yu Gothic UI Semibold" charset="-128"/>
             </a:endParaRPr>
           </a:p>
         </p:txBody>
@@ -11427,8 +11420,8 @@
                 <a:solidFill>
                   <a:schemeClr val="bg1"/>
                 </a:solidFill>
-                <a:latin typeface="Arial" panose="020B0604020202020204" pitchFamily="34" charset="0"/>
-                <a:ea typeface="Arial" panose="020B0604020202020204" pitchFamily="34" charset="0"/>
+                <a:latin typeface="Arial" pitchFamily="34" charset="0"/>
+                <a:ea typeface="Arial" pitchFamily="34" charset="0"/>
                 <a:sym typeface="+mn-ea"/>
               </a:rPr>
               <a:t> </a:t>
@@ -11438,8 +11431,8 @@
                 <a:solidFill>
                   <a:schemeClr val="bg1"/>
                 </a:solidFill>
-                <a:latin typeface="Arial" panose="020B0604020202020204" pitchFamily="34" charset="0"/>
-                <a:ea typeface="Arial" panose="020B0604020202020204" pitchFamily="34" charset="0"/>
+                <a:latin typeface="Arial" pitchFamily="34" charset="0"/>
+                <a:ea typeface="Arial" pitchFamily="34" charset="0"/>
                 <a:sym typeface="+mn-ea"/>
               </a:rPr>
               <a:t>YahBoom     </a:t>
@@ -11449,8 +11442,8 @@
                 <a:solidFill>
                   <a:schemeClr val="bg1"/>
                 </a:solidFill>
-                <a:latin typeface="微软雅黑" panose="020B0503020204020204" charset="-122"/>
-                <a:ea typeface="微软雅黑" panose="020B0503020204020204" charset="-122"/>
+                <a:latin typeface="微软雅黑" charset="-122"/>
+                <a:ea typeface="微软雅黑" charset="-122"/>
                 <a:sym typeface="+mn-ea"/>
               </a:rPr>
               <a:t>Croco:Kit </a:t>
@@ -11460,8 +11453,8 @@
                 <a:solidFill>
                   <a:schemeClr val="bg1"/>
                 </a:solidFill>
-                <a:latin typeface="Arial" panose="020B0604020202020204" pitchFamily="34" charset="0"/>
-                <a:ea typeface="Arial" panose="020B0604020202020204" pitchFamily="34" charset="0"/>
+                <a:latin typeface="Arial" pitchFamily="34" charset="0"/>
+                <a:ea typeface="Arial" pitchFamily="34" charset="0"/>
                 <a:sym typeface="+mn-ea"/>
               </a:rPr>
               <a:t>tutorial</a:t>
@@ -11498,8 +11491,8 @@
                     <a:lumMod val="75000"/>
                   </a:schemeClr>
                 </a:solidFill>
-                <a:latin typeface="Arial" panose="020B0604020202020204" pitchFamily="34" charset="0"/>
-                <a:ea typeface="Arial" panose="020B0604020202020204" pitchFamily="34" charset="0"/>
+                <a:latin typeface="Arial" pitchFamily="34" charset="0"/>
+                <a:ea typeface="Arial" pitchFamily="34" charset="0"/>
               </a:rPr>
               <a:t>Powered by  </a:t>
             </a:r>
@@ -11510,8 +11503,8 @@
                     <a:lumMod val="75000"/>
                   </a:schemeClr>
                 </a:solidFill>
-                <a:latin typeface="Arial" panose="020B0604020202020204" pitchFamily="34" charset="0"/>
-                <a:ea typeface="Arial" panose="020B0604020202020204" pitchFamily="34" charset="0"/>
+                <a:latin typeface="Arial" pitchFamily="34" charset="0"/>
+                <a:ea typeface="Arial" pitchFamily="34" charset="0"/>
               </a:rPr>
               <a:t>YahBoom</a:t>
             </a:r>
@@ -11521,8 +11514,8 @@
                   <a:lumMod val="75000"/>
                 </a:schemeClr>
               </a:solidFill>
-              <a:latin typeface="Arial" panose="020B0604020202020204" pitchFamily="34" charset="0"/>
-              <a:ea typeface="Arial" panose="020B0604020202020204" pitchFamily="34" charset="0"/>
+              <a:latin typeface="Arial" pitchFamily="34" charset="0"/>
+              <a:ea typeface="Arial" pitchFamily="34" charset="0"/>
             </a:endParaRPr>
           </a:p>
         </p:txBody>
@@ -11556,8 +11549,8 @@
                     <a:lumMod val="75000"/>
                   </a:schemeClr>
                 </a:solidFill>
-                <a:latin typeface="Arial" panose="020B0604020202020204" pitchFamily="34" charset="0"/>
-                <a:ea typeface="Arial" panose="020B0604020202020204" pitchFamily="34" charset="0"/>
+                <a:latin typeface="Arial" pitchFamily="34" charset="0"/>
+                <a:ea typeface="Arial" pitchFamily="34" charset="0"/>
               </a:rPr>
               <a:t>micro:bit</a:t>
             </a:r>
@@ -11567,8 +11560,8 @@
                   <a:lumMod val="75000"/>
                 </a:schemeClr>
               </a:solidFill>
-              <a:latin typeface="Arial" panose="020B0604020202020204" pitchFamily="34" charset="0"/>
-              <a:ea typeface="Arial" panose="020B0604020202020204" pitchFamily="34" charset="0"/>
+              <a:latin typeface="Arial" pitchFamily="34" charset="0"/>
+              <a:ea typeface="Arial" pitchFamily="34" charset="0"/>
             </a:endParaRPr>
           </a:p>
           <a:p>
@@ -11580,8 +11573,8 @@
                     <a:lumMod val="75000"/>
                   </a:schemeClr>
                 </a:solidFill>
-                <a:latin typeface="Arial" panose="020B0604020202020204" pitchFamily="34" charset="0"/>
-                <a:ea typeface="Arial" panose="020B0604020202020204" pitchFamily="34" charset="0"/>
+                <a:latin typeface="Arial" pitchFamily="34" charset="0"/>
+                <a:ea typeface="Arial" pitchFamily="34" charset="0"/>
               </a:rPr>
               <a:t>project </a:t>
             </a:r>
@@ -11591,8 +11584,8 @@
                   <a:lumMod val="75000"/>
                 </a:schemeClr>
               </a:solidFill>
-              <a:latin typeface="Arial" panose="020B0604020202020204" pitchFamily="34" charset="0"/>
-              <a:ea typeface="Arial" panose="020B0604020202020204" pitchFamily="34" charset="0"/>
+              <a:latin typeface="Arial" pitchFamily="34" charset="0"/>
+              <a:ea typeface="Arial" pitchFamily="34" charset="0"/>
             </a:endParaRPr>
           </a:p>
         </p:txBody>
@@ -11626,8 +11619,8 @@
                     <a:lumMod val="75000"/>
                   </a:schemeClr>
                 </a:solidFill>
-                <a:latin typeface="Arial" panose="020B0604020202020204" pitchFamily="34" charset="0"/>
-                <a:ea typeface="Arial" panose="020B0604020202020204" pitchFamily="34" charset="0"/>
+                <a:latin typeface="Arial" pitchFamily="34" charset="0"/>
+                <a:ea typeface="Arial" pitchFamily="34" charset="0"/>
               </a:rPr>
               <a:t>Thank </a:t>
             </a:r>
@@ -11638,8 +11631,8 @@
                     <a:lumMod val="75000"/>
                   </a:schemeClr>
                 </a:solidFill>
-                <a:latin typeface="Arial" panose="020B0604020202020204" pitchFamily="34" charset="0"/>
-                <a:ea typeface="Arial" panose="020B0604020202020204" pitchFamily="34" charset="0"/>
+                <a:latin typeface="Arial" pitchFamily="34" charset="0"/>
+                <a:ea typeface="Arial" pitchFamily="34" charset="0"/>
               </a:rPr>
               <a:t>you</a:t>
             </a:r>
@@ -11650,8 +11643,8 @@
                     <a:lumMod val="75000"/>
                   </a:schemeClr>
                 </a:solidFill>
-                <a:latin typeface="Arial" panose="020B0604020202020204" pitchFamily="34" charset="0"/>
-                <a:ea typeface="Arial" panose="020B0604020202020204" pitchFamily="34" charset="0"/>
+                <a:latin typeface="Arial" pitchFamily="34" charset="0"/>
+                <a:ea typeface="Arial" pitchFamily="34" charset="0"/>
               </a:rPr>
               <a:t> ！</a:t>
             </a:r>
@@ -11661,8 +11654,8 @@
                   <a:lumMod val="75000"/>
                 </a:schemeClr>
               </a:solidFill>
-              <a:latin typeface="Arial" panose="020B0604020202020204" pitchFamily="34" charset="0"/>
-              <a:ea typeface="Arial" panose="020B0604020202020204" pitchFamily="34" charset="0"/>
+              <a:latin typeface="Arial" pitchFamily="34" charset="0"/>
+              <a:ea typeface="Arial" pitchFamily="34" charset="0"/>
             </a:endParaRPr>
           </a:p>
         </p:txBody>
@@ -11704,28 +11697,28 @@
                 <a:solidFill>
                   <a:schemeClr val="bg1"/>
                 </a:solidFill>
-                <a:latin typeface="微软雅黑" panose="020B0503020204020204" charset="-122"/>
-                <a:ea typeface="微软雅黑" panose="020B0503020204020204" charset="-122"/>
+                <a:latin typeface="微软雅黑" charset="-122"/>
+                <a:ea typeface="微软雅黑" charset="-122"/>
               </a:rPr>
               <a:t>Preparation before class</a:t>
             </a:r>
             <a:r>
               <a:rPr lang="zh-CN" altLang="en-US" sz="2800" dirty="0">
                 <a:latin typeface="icomoon" charset="0"/>
-                <a:ea typeface="Yu Gothic UI Semibold" panose="020B0700000000000000" charset="-128"/>
+                <a:ea typeface="Yu Gothic UI Semibold" charset="-128"/>
               </a:rPr>
               <a:t>          </a:t>
             </a:r>
             <a:r>
               <a:rPr lang="zh-CN" altLang="en-US" sz="2800" u="sng" dirty="0">
                 <a:latin typeface="icomoon" charset="0"/>
-                <a:ea typeface="Yu Gothic UI Semibold" panose="020B0700000000000000" charset="-128"/>
+                <a:ea typeface="Yu Gothic UI Semibold" charset="-128"/>
               </a:rPr>
               <a:t>                     </a:t>
             </a:r>
             <a:endParaRPr lang="zh-CN" altLang="en-US" sz="2800" u="sng" dirty="0">
               <a:latin typeface="icomoon" charset="0"/>
-              <a:ea typeface="Yu Gothic UI Semibold" panose="020B0700000000000000" charset="-128"/>
+              <a:ea typeface="Yu Gothic UI Semibold" charset="-128"/>
             </a:endParaRPr>
           </a:p>
         </p:txBody>
@@ -13228,22 +13221,22 @@
                   <a:solidFill>
                     <a:schemeClr val="tx1"/>
                   </a:solidFill>
-                  <a:latin typeface="Arial" panose="020B0604020202020204" pitchFamily="34" charset="0"/>
-                  <a:ea typeface="Arial" panose="020B0604020202020204" pitchFamily="34" charset="0"/>
+                  <a:latin typeface="Arial" pitchFamily="34" charset="0"/>
+                  <a:ea typeface="Arial" pitchFamily="34" charset="0"/>
                   <a:sym typeface="+mn-ea"/>
                 </a:rPr>
                 <a:t>Part</a:t>
               </a:r>
               <a:r>
                 <a:rPr lang="en-US" altLang="zh-CN" dirty="0" smtClean="0">
-                  <a:latin typeface="Arial" panose="020B0604020202020204" pitchFamily="34" charset="0"/>
-                  <a:ea typeface="Arial" panose="020B0604020202020204" pitchFamily="34" charset="0"/>
+                  <a:latin typeface="Arial" pitchFamily="34" charset="0"/>
+                  <a:ea typeface="Arial" pitchFamily="34" charset="0"/>
                 </a:rPr>
                 <a:t> 1</a:t>
               </a:r>
               <a:endParaRPr lang="zh-CN" altLang="en-US" dirty="0">
-                <a:latin typeface="Arial" panose="020B0604020202020204" pitchFamily="34" charset="0"/>
-                <a:ea typeface="Arial" panose="020B0604020202020204" pitchFamily="34" charset="0"/>
+                <a:latin typeface="Arial" pitchFamily="34" charset="0"/>
+                <a:ea typeface="Arial" pitchFamily="34" charset="0"/>
               </a:endParaRPr>
             </a:p>
           </p:txBody>
@@ -13278,8 +13271,8 @@
                       <a:lumMod val="75000"/>
                     </a:schemeClr>
                   </a:solidFill>
-                  <a:latin typeface="Arial" panose="020B0604020202020204" pitchFamily="34" charset="0"/>
-                  <a:ea typeface="Arial" panose="020B0604020202020204" pitchFamily="34" charset="0"/>
+                  <a:latin typeface="Arial" pitchFamily="34" charset="0"/>
+                  <a:ea typeface="Arial" pitchFamily="34" charset="0"/>
                   <a:hlinkClick r:id="rId2" action="ppaction://hlinksldjump"/>
                 </a:rPr>
                 <a:t>micro:bit introduce</a:t>
@@ -13290,8 +13283,8 @@
                     <a:lumMod val="75000"/>
                   </a:schemeClr>
                 </a:solidFill>
-                <a:latin typeface="Arial" panose="020B0604020202020204" pitchFamily="34" charset="0"/>
-                <a:ea typeface="Arial" panose="020B0604020202020204" pitchFamily="34" charset="0"/>
+                <a:latin typeface="Arial" pitchFamily="34" charset="0"/>
+                <a:ea typeface="Arial" pitchFamily="34" charset="0"/>
               </a:endParaRPr>
             </a:p>
           </p:txBody>
@@ -13329,22 +13322,22 @@
                   <a:solidFill>
                     <a:schemeClr val="tx1"/>
                   </a:solidFill>
-                  <a:latin typeface="Arial" panose="020B0604020202020204" pitchFamily="34" charset="0"/>
-                  <a:ea typeface="Arial" panose="020B0604020202020204" pitchFamily="34" charset="0"/>
+                  <a:latin typeface="Arial" pitchFamily="34" charset="0"/>
+                  <a:ea typeface="Arial" pitchFamily="34" charset="0"/>
                   <a:sym typeface="+mn-ea"/>
                 </a:rPr>
                 <a:t>Part</a:t>
               </a:r>
               <a:r>
                 <a:rPr lang="en-US" altLang="zh-CN" dirty="0" smtClean="0">
-                  <a:latin typeface="Arial" panose="020B0604020202020204" pitchFamily="34" charset="0"/>
-                  <a:ea typeface="Arial" panose="020B0604020202020204" pitchFamily="34" charset="0"/>
+                  <a:latin typeface="Arial" pitchFamily="34" charset="0"/>
+                  <a:ea typeface="Arial" pitchFamily="34" charset="0"/>
                 </a:rPr>
                 <a:t> 2</a:t>
               </a:r>
               <a:endParaRPr lang="zh-CN" altLang="en-US" dirty="0">
-                <a:latin typeface="Arial" panose="020B0604020202020204" pitchFamily="34" charset="0"/>
-                <a:ea typeface="Arial" panose="020B0604020202020204" pitchFamily="34" charset="0"/>
+                <a:latin typeface="Arial" pitchFamily="34" charset="0"/>
+                <a:ea typeface="Arial" pitchFamily="34" charset="0"/>
               </a:endParaRPr>
             </a:p>
           </p:txBody>
@@ -13379,8 +13372,8 @@
                       <a:lumMod val="75000"/>
                     </a:schemeClr>
                   </a:solidFill>
-                  <a:latin typeface="Arial" panose="020B0604020202020204" pitchFamily="34" charset="0"/>
-                  <a:ea typeface="Arial" panose="020B0604020202020204" pitchFamily="34" charset="0"/>
+                  <a:latin typeface="Arial" pitchFamily="34" charset="0"/>
+                  <a:ea typeface="Arial" pitchFamily="34" charset="0"/>
                   <a:hlinkClick r:id="rId3" action="ppaction://hlinksldjump"/>
                 </a:rPr>
                 <a:t>Open programming web</a:t>
@@ -13391,8 +13384,8 @@
                     <a:lumMod val="75000"/>
                   </a:schemeClr>
                 </a:solidFill>
-                <a:latin typeface="Arial" panose="020B0604020202020204" pitchFamily="34" charset="0"/>
-                <a:ea typeface="Arial" panose="020B0604020202020204" pitchFamily="34" charset="0"/>
+                <a:latin typeface="Arial" pitchFamily="34" charset="0"/>
+                <a:ea typeface="Arial" pitchFamily="34" charset="0"/>
                 <a:hlinkClick r:id="rId3" action="ppaction://hlinksldjump"/>
               </a:endParaRPr>
             </a:p>
@@ -13431,22 +13424,22 @@
                   <a:solidFill>
                     <a:schemeClr val="tx1"/>
                   </a:solidFill>
-                  <a:latin typeface="Arial" panose="020B0604020202020204" pitchFamily="34" charset="0"/>
-                  <a:ea typeface="Arial" panose="020B0604020202020204" pitchFamily="34" charset="0"/>
+                  <a:latin typeface="Arial" pitchFamily="34" charset="0"/>
+                  <a:ea typeface="Arial" pitchFamily="34" charset="0"/>
                   <a:sym typeface="+mn-ea"/>
                 </a:rPr>
                 <a:t>Part </a:t>
               </a:r>
               <a:r>
                 <a:rPr lang="en-US" altLang="zh-CN" dirty="0" smtClean="0">
-                  <a:latin typeface="Arial" panose="020B0604020202020204" pitchFamily="34" charset="0"/>
-                  <a:ea typeface="Arial" panose="020B0604020202020204" pitchFamily="34" charset="0"/>
+                  <a:latin typeface="Arial" pitchFamily="34" charset="0"/>
+                  <a:ea typeface="Arial" pitchFamily="34" charset="0"/>
                 </a:rPr>
                 <a:t>3</a:t>
               </a:r>
               <a:endParaRPr lang="zh-CN" altLang="en-US" dirty="0">
-                <a:latin typeface="Arial" panose="020B0604020202020204" pitchFamily="34" charset="0"/>
-                <a:ea typeface="Arial" panose="020B0604020202020204" pitchFamily="34" charset="0"/>
+                <a:latin typeface="Arial" pitchFamily="34" charset="0"/>
+                <a:ea typeface="Arial" pitchFamily="34" charset="0"/>
               </a:endParaRPr>
             </a:p>
           </p:txBody>
@@ -13480,8 +13473,8 @@
                       <a:lumMod val="75000"/>
                     </a:schemeClr>
                   </a:solidFill>
-                  <a:latin typeface="Arial" panose="020B0604020202020204" pitchFamily="34" charset="0"/>
-                  <a:ea typeface="Arial" panose="020B0604020202020204" pitchFamily="34" charset="0"/>
+                  <a:latin typeface="Arial" pitchFamily="34" charset="0"/>
+                  <a:ea typeface="Arial" pitchFamily="34" charset="0"/>
                   <a:hlinkClick r:id="rId4" action="ppaction://hlinksldjump"/>
                 </a:rPr>
                 <a:t>Add YahBoom extension </a:t>
@@ -13492,8 +13485,8 @@
                     <a:lumMod val="75000"/>
                   </a:schemeClr>
                 </a:solidFill>
-                <a:latin typeface="Arial" panose="020B0604020202020204" pitchFamily="34" charset="0"/>
-                <a:ea typeface="Arial" panose="020B0604020202020204" pitchFamily="34" charset="0"/>
+                <a:latin typeface="Arial" pitchFamily="34" charset="0"/>
+                <a:ea typeface="Arial" pitchFamily="34" charset="0"/>
                 <a:hlinkClick r:id="rId4" action="ppaction://hlinksldjump"/>
               </a:endParaRPr>
             </a:p>
@@ -13532,22 +13525,22 @@
                   <a:solidFill>
                     <a:schemeClr val="tx1"/>
                   </a:solidFill>
-                  <a:latin typeface="Arial" panose="020B0604020202020204" pitchFamily="34" charset="0"/>
-                  <a:ea typeface="Arial" panose="020B0604020202020204" pitchFamily="34" charset="0"/>
+                  <a:latin typeface="Arial" pitchFamily="34" charset="0"/>
+                  <a:ea typeface="Arial" pitchFamily="34" charset="0"/>
                   <a:sym typeface="+mn-ea"/>
                 </a:rPr>
                 <a:t>Part </a:t>
               </a:r>
               <a:r>
                 <a:rPr lang="en-US" altLang="zh-CN" dirty="0" smtClean="0">
-                  <a:latin typeface="Arial" panose="020B0604020202020204" pitchFamily="34" charset="0"/>
-                  <a:ea typeface="Arial" panose="020B0604020202020204" pitchFamily="34" charset="0"/>
+                  <a:latin typeface="Arial" pitchFamily="34" charset="0"/>
+                  <a:ea typeface="Arial" pitchFamily="34" charset="0"/>
                 </a:rPr>
                 <a:t>4</a:t>
               </a:r>
               <a:endParaRPr lang="zh-CN" altLang="en-US" dirty="0">
-                <a:latin typeface="Arial" panose="020B0604020202020204" pitchFamily="34" charset="0"/>
-                <a:ea typeface="Arial" panose="020B0604020202020204" pitchFamily="34" charset="0"/>
+                <a:latin typeface="Arial" pitchFamily="34" charset="0"/>
+                <a:ea typeface="Arial" pitchFamily="34" charset="0"/>
               </a:endParaRPr>
             </a:p>
           </p:txBody>
@@ -13581,8 +13574,8 @@
                       <a:lumMod val="75000"/>
                     </a:schemeClr>
                   </a:solidFill>
-                  <a:latin typeface="Arial" panose="020B0604020202020204" pitchFamily="34" charset="0"/>
-                  <a:ea typeface="Arial" panose="020B0604020202020204" pitchFamily="34" charset="0"/>
+                  <a:latin typeface="Arial" pitchFamily="34" charset="0"/>
+                  <a:ea typeface="Arial" pitchFamily="34" charset="0"/>
                   <a:hlinkClick r:id="rId5" action="ppaction://hlinksldjump"/>
                 </a:rPr>
                 <a:t>Downtown </a:t>
@@ -13593,8 +13586,8 @@
                     <a:lumMod val="75000"/>
                   </a:schemeClr>
                 </a:solidFill>
-                <a:latin typeface="Arial" panose="020B0604020202020204" pitchFamily="34" charset="0"/>
-                <a:ea typeface="Arial" panose="020B0604020202020204" pitchFamily="34" charset="0"/>
+                <a:latin typeface="Arial" pitchFamily="34" charset="0"/>
+                <a:ea typeface="Arial" pitchFamily="34" charset="0"/>
                 <a:hlinkClick r:id="rId5" action="ppaction://hlinksldjump"/>
               </a:endParaRPr>
             </a:p>
@@ -13996,8 +13989,8 @@
                 <a:solidFill>
                   <a:schemeClr val="bg1"/>
                 </a:solidFill>
-                <a:latin typeface="Arial" panose="020B0604020202020204" pitchFamily="34" charset="0"/>
-                <a:ea typeface="Arial" panose="020B0604020202020204" pitchFamily="34" charset="0"/>
+                <a:latin typeface="Arial" pitchFamily="34" charset="0"/>
+                <a:ea typeface="Arial" pitchFamily="34" charset="0"/>
                 <a:sym typeface="+mn-ea"/>
               </a:rPr>
               <a:t> </a:t>
@@ -14007,8 +14000,8 @@
                 <a:solidFill>
                   <a:schemeClr val="bg1"/>
                 </a:solidFill>
-                <a:latin typeface="Arial" panose="020B0604020202020204" pitchFamily="34" charset="0"/>
-                <a:ea typeface="Arial" panose="020B0604020202020204" pitchFamily="34" charset="0"/>
+                <a:latin typeface="Arial" pitchFamily="34" charset="0"/>
+                <a:ea typeface="Arial" pitchFamily="34" charset="0"/>
                 <a:sym typeface="+mn-ea"/>
               </a:rPr>
               <a:t>YahBoom     </a:t>
@@ -14018,8 +14011,8 @@
                 <a:solidFill>
                   <a:schemeClr val="bg1"/>
                 </a:solidFill>
-                <a:latin typeface="微软雅黑" panose="020B0503020204020204" charset="-122"/>
-                <a:ea typeface="微软雅黑" panose="020B0503020204020204" charset="-122"/>
+                <a:latin typeface="微软雅黑" charset="-122"/>
+                <a:ea typeface="微软雅黑" charset="-122"/>
                 <a:sym typeface="+mn-ea"/>
               </a:rPr>
               <a:t>Croco:Kit </a:t>
@@ -14029,8 +14022,8 @@
                 <a:solidFill>
                   <a:schemeClr val="bg1"/>
                 </a:solidFill>
-                <a:latin typeface="Arial" panose="020B0604020202020204" pitchFamily="34" charset="0"/>
-                <a:ea typeface="Arial" panose="020B0604020202020204" pitchFamily="34" charset="0"/>
+                <a:latin typeface="Arial" pitchFamily="34" charset="0"/>
+                <a:ea typeface="Arial" pitchFamily="34" charset="0"/>
                 <a:sym typeface="+mn-ea"/>
               </a:rPr>
               <a:t>tutorial</a:t>
@@ -14068,8 +14061,8 @@
                     <a:lumMod val="75000"/>
                   </a:schemeClr>
                 </a:solidFill>
-                <a:latin typeface="Arial" panose="020B0604020202020204" pitchFamily="34" charset="0"/>
-                <a:ea typeface="Arial" panose="020B0604020202020204" pitchFamily="34" charset="0"/>
+                <a:latin typeface="Arial" pitchFamily="34" charset="0"/>
+                <a:ea typeface="Arial" pitchFamily="34" charset="0"/>
               </a:rPr>
               <a:t>C</a:t>
             </a:r>
@@ -14080,8 +14073,8 @@
                     <a:lumMod val="75000"/>
                   </a:schemeClr>
                 </a:solidFill>
-                <a:latin typeface="Arial" panose="020B0604020202020204" pitchFamily="34" charset="0"/>
-                <a:ea typeface="Arial" panose="020B0604020202020204" pitchFamily="34" charset="0"/>
+                <a:latin typeface="Arial" pitchFamily="34" charset="0"/>
+                <a:ea typeface="Arial" pitchFamily="34" charset="0"/>
               </a:rPr>
               <a:t>ontent</a:t>
             </a:r>
@@ -14091,8 +14084,8 @@
                   <a:lumMod val="75000"/>
                 </a:schemeClr>
               </a:solidFill>
-              <a:latin typeface="Arial" panose="020B0604020202020204" pitchFamily="34" charset="0"/>
-              <a:ea typeface="Arial" panose="020B0604020202020204" pitchFamily="34" charset="0"/>
+              <a:latin typeface="Arial" pitchFamily="34" charset="0"/>
+              <a:ea typeface="Arial" pitchFamily="34" charset="0"/>
             </a:endParaRPr>
           </a:p>
         </p:txBody>
@@ -14134,28 +14127,28 @@
                 <a:solidFill>
                   <a:schemeClr val="bg1"/>
                 </a:solidFill>
-                <a:latin typeface="微软雅黑" panose="020B0503020204020204" charset="-122"/>
-                <a:ea typeface="微软雅黑" panose="020B0503020204020204" charset="-122"/>
+                <a:latin typeface="微软雅黑" charset="-122"/>
+                <a:ea typeface="微软雅黑" charset="-122"/>
               </a:rPr>
               <a:t>Preparation before class</a:t>
             </a:r>
             <a:r>
               <a:rPr lang="zh-CN" altLang="en-US" sz="2800" dirty="0">
                 <a:latin typeface="icomoon" charset="0"/>
-                <a:ea typeface="Yu Gothic UI Semibold" panose="020B0700000000000000" charset="-128"/>
+                <a:ea typeface="Yu Gothic UI Semibold" charset="-128"/>
               </a:rPr>
               <a:t>          </a:t>
             </a:r>
             <a:r>
               <a:rPr lang="zh-CN" altLang="en-US" sz="2800" u="sng" dirty="0">
                 <a:latin typeface="icomoon" charset="0"/>
-                <a:ea typeface="Yu Gothic UI Semibold" panose="020B0700000000000000" charset="-128"/>
+                <a:ea typeface="Yu Gothic UI Semibold" charset="-128"/>
               </a:rPr>
               <a:t>                     </a:t>
             </a:r>
             <a:endParaRPr lang="zh-CN" altLang="en-US" sz="2800" u="sng" dirty="0">
               <a:latin typeface="icomoon" charset="0"/>
-              <a:ea typeface="Yu Gothic UI Semibold" panose="020B0700000000000000" charset="-128"/>
+              <a:ea typeface="Yu Gothic UI Semibold" charset="-128"/>
             </a:endParaRPr>
           </a:p>
         </p:txBody>
@@ -14583,8 +14576,8 @@
                 <a:solidFill>
                   <a:schemeClr val="bg1"/>
                 </a:solidFill>
-                <a:latin typeface="Arial" panose="020B0604020202020204" pitchFamily="34" charset="0"/>
-                <a:ea typeface="Arial" panose="020B0604020202020204" pitchFamily="34" charset="0"/>
+                <a:latin typeface="Arial" pitchFamily="34" charset="0"/>
+                <a:ea typeface="Arial" pitchFamily="34" charset="0"/>
                 <a:sym typeface="+mn-ea"/>
               </a:rPr>
               <a:t> </a:t>
@@ -14594,8 +14587,8 @@
                 <a:solidFill>
                   <a:schemeClr val="bg1"/>
                 </a:solidFill>
-                <a:latin typeface="Arial" panose="020B0604020202020204" pitchFamily="34" charset="0"/>
-                <a:ea typeface="Arial" panose="020B0604020202020204" pitchFamily="34" charset="0"/>
+                <a:latin typeface="Arial" pitchFamily="34" charset="0"/>
+                <a:ea typeface="Arial" pitchFamily="34" charset="0"/>
                 <a:sym typeface="+mn-ea"/>
               </a:rPr>
               <a:t>YahBoom     </a:t>
@@ -14605,8 +14598,8 @@
                 <a:solidFill>
                   <a:schemeClr val="bg1"/>
                 </a:solidFill>
-                <a:latin typeface="微软雅黑" panose="020B0503020204020204" charset="-122"/>
-                <a:ea typeface="微软雅黑" panose="020B0503020204020204" charset="-122"/>
+                <a:latin typeface="微软雅黑" charset="-122"/>
+                <a:ea typeface="微软雅黑" charset="-122"/>
                 <a:sym typeface="+mn-ea"/>
               </a:rPr>
               <a:t>Croco:Kit </a:t>
@@ -14616,8 +14609,8 @@
                 <a:solidFill>
                   <a:schemeClr val="bg1"/>
                 </a:solidFill>
-                <a:latin typeface="Arial" panose="020B0604020202020204" pitchFamily="34" charset="0"/>
-                <a:ea typeface="Arial" panose="020B0604020202020204" pitchFamily="34" charset="0"/>
+                <a:latin typeface="Arial" pitchFamily="34" charset="0"/>
+                <a:ea typeface="Arial" pitchFamily="34" charset="0"/>
                 <a:sym typeface="+mn-ea"/>
               </a:rPr>
               <a:t>tutorial</a:t>
@@ -14745,8 +14738,8 @@
                     </a:srgbClr>
                   </a:outerShdw>
                 </a:effectLst>
-                <a:latin typeface="微软雅黑 Light" panose="020B0502040204020203" charset="-122"/>
-                <a:ea typeface="微软雅黑 Light" panose="020B0502040204020203" charset="-122"/>
+                <a:latin typeface="微软雅黑 Light" charset="-122"/>
+                <a:ea typeface="微软雅黑 Light" charset="-122"/>
               </a:endParaRPr>
             </a:p>
           </p:txBody>
@@ -14978,15 +14971,15 @@
                     <a:lumMod val="75000"/>
                   </a:schemeClr>
                 </a:solidFill>
-                <a:latin typeface="Arial" panose="020B0604020202020204" pitchFamily="34" charset="0"/>
-                <a:ea typeface="Arial" panose="020B0604020202020204" pitchFamily="34" charset="0"/>
+                <a:latin typeface="Arial" pitchFamily="34" charset="0"/>
+                <a:ea typeface="Arial" pitchFamily="34" charset="0"/>
                 <a:sym typeface="+mn-ea"/>
               </a:rPr>
               <a:t>Part 1</a:t>
             </a:r>
             <a:endParaRPr lang="zh-CN" altLang="en-US" sz="2800" dirty="0">
-              <a:latin typeface="Arial" panose="020B0604020202020204" pitchFamily="34" charset="0"/>
-              <a:ea typeface="Arial" panose="020B0604020202020204" pitchFamily="34" charset="0"/>
+              <a:latin typeface="Arial" pitchFamily="34" charset="0"/>
+              <a:ea typeface="Arial" pitchFamily="34" charset="0"/>
             </a:endParaRPr>
           </a:p>
         </p:txBody>
@@ -15248,8 +15241,8 @@
                     </a:srgbClr>
                   </a:outerShdw>
                 </a:effectLst>
-                <a:latin typeface="Arial" panose="020B0604020202020204" pitchFamily="34" charset="0"/>
-                <a:ea typeface="Arial" panose="020B0604020202020204" pitchFamily="34" charset="0"/>
+                <a:latin typeface="Arial" pitchFamily="34" charset="0"/>
+                <a:ea typeface="Arial" pitchFamily="34" charset="0"/>
                 <a:sym typeface="+mn-ea"/>
               </a:rPr>
               <a:t>What's </a:t>
@@ -15266,8 +15259,8 @@
                     </a:srgbClr>
                   </a:outerShdw>
                 </a:effectLst>
-                <a:latin typeface="Arial" panose="020B0604020202020204" pitchFamily="34" charset="0"/>
-                <a:ea typeface="Arial" panose="020B0604020202020204" pitchFamily="34" charset="0"/>
+                <a:latin typeface="Arial" pitchFamily="34" charset="0"/>
+                <a:ea typeface="Arial" pitchFamily="34" charset="0"/>
                 <a:sym typeface="+mn-ea"/>
               </a:rPr>
               <a:t>micro:bit</a:t>
@@ -15284,8 +15277,8 @@
                     </a:srgbClr>
                   </a:outerShdw>
                 </a:effectLst>
-                <a:latin typeface="Arial" panose="020B0604020202020204" pitchFamily="34" charset="0"/>
-                <a:ea typeface="Arial" panose="020B0604020202020204" pitchFamily="34" charset="0"/>
+                <a:latin typeface="Arial" pitchFamily="34" charset="0"/>
+                <a:ea typeface="Arial" pitchFamily="34" charset="0"/>
                 <a:sym typeface="+mn-ea"/>
               </a:rPr>
               <a:t>?</a:t>
@@ -15301,8 +15294,8 @@
                   </a:srgbClr>
                 </a:outerShdw>
               </a:effectLst>
-              <a:latin typeface="Arial" panose="020B0604020202020204" pitchFamily="34" charset="0"/>
-              <a:ea typeface="Arial" panose="020B0604020202020204" pitchFamily="34" charset="0"/>
+              <a:latin typeface="Arial" pitchFamily="34" charset="0"/>
+              <a:ea typeface="Arial" pitchFamily="34" charset="0"/>
               <a:sym typeface="+mn-ea"/>
             </a:endParaRPr>
           </a:p>
@@ -15337,8 +15330,8 @@
                     <a:lumMod val="75000"/>
                   </a:schemeClr>
                 </a:solidFill>
-                <a:latin typeface="微软雅黑 Light" panose="020B0502040204020203" charset="-122"/>
-                <a:ea typeface="微软雅黑 Light" panose="020B0502040204020203" charset="-122"/>
+                <a:latin typeface="微软雅黑 Light" charset="-122"/>
+                <a:ea typeface="微软雅黑 Light" charset="-122"/>
               </a:rPr>
               <a:t>       </a:t>
             </a:r>
@@ -15349,8 +15342,8 @@
                     <a:lumMod val="75000"/>
                   </a:schemeClr>
                 </a:solidFill>
-                <a:latin typeface="Arial" panose="020B0604020202020204" pitchFamily="34" charset="0"/>
-                <a:ea typeface="Arial" panose="020B0604020202020204" pitchFamily="34" charset="0"/>
+                <a:latin typeface="Arial" pitchFamily="34" charset="0"/>
+                <a:ea typeface="Arial" pitchFamily="34" charset="0"/>
               </a:rPr>
               <a:t>Micro:</a:t>
             </a:r>
@@ -15361,8 +15354,8 @@
                     <a:lumMod val="75000"/>
                   </a:schemeClr>
                 </a:solidFill>
-                <a:latin typeface="Arial" panose="020B0604020202020204" pitchFamily="34" charset="0"/>
-                <a:ea typeface="Arial" panose="020B0604020202020204" pitchFamily="34" charset="0"/>
+                <a:latin typeface="Arial" pitchFamily="34" charset="0"/>
+                <a:ea typeface="Arial" pitchFamily="34" charset="0"/>
               </a:rPr>
               <a:t>Bit is a microcomputer designed by the </a:t>
             </a:r>
@@ -15373,8 +15366,8 @@
                     <a:lumMod val="75000"/>
                   </a:schemeClr>
                 </a:solidFill>
-                <a:latin typeface="Arial" panose="020B0604020202020204" pitchFamily="34" charset="0"/>
-                <a:ea typeface="Arial" panose="020B0604020202020204" pitchFamily="34" charset="0"/>
+                <a:latin typeface="Arial" pitchFamily="34" charset="0"/>
+                <a:ea typeface="Arial" pitchFamily="34" charset="0"/>
               </a:rPr>
               <a:t>BBC </a:t>
             </a:r>
@@ -15385,8 +15378,8 @@
                     <a:lumMod val="75000"/>
                   </a:schemeClr>
                 </a:solidFill>
-                <a:latin typeface="Arial" panose="020B0604020202020204" pitchFamily="34" charset="0"/>
-                <a:ea typeface="Arial" panose="020B0604020202020204" pitchFamily="34" charset="0"/>
+                <a:latin typeface="Arial" pitchFamily="34" charset="0"/>
+                <a:ea typeface="Arial" pitchFamily="34" charset="0"/>
               </a:rPr>
               <a:t>for adolescent programming education, which is developed by Microsoft, Samsung, ARM, University of Lancaster, UK and so on.</a:t>
             </a:r>
@@ -15396,8 +15389,8 @@
                   <a:lumMod val="75000"/>
                 </a:schemeClr>
               </a:solidFill>
-              <a:latin typeface="Arial" panose="020B0604020202020204" pitchFamily="34" charset="0"/>
-              <a:ea typeface="Arial" panose="020B0604020202020204" pitchFamily="34" charset="0"/>
+              <a:latin typeface="Arial" pitchFamily="34" charset="0"/>
+              <a:ea typeface="Arial" pitchFamily="34" charset="0"/>
             </a:endParaRPr>
           </a:p>
         </p:txBody>
@@ -15487,28 +15480,28 @@
                 <a:solidFill>
                   <a:schemeClr val="bg1"/>
                 </a:solidFill>
-                <a:latin typeface="微软雅黑" panose="020B0503020204020204" charset="-122"/>
-                <a:ea typeface="微软雅黑" panose="020B0503020204020204" charset="-122"/>
+                <a:latin typeface="微软雅黑" charset="-122"/>
+                <a:ea typeface="微软雅黑" charset="-122"/>
               </a:rPr>
               <a:t>Preparation before class</a:t>
             </a:r>
             <a:r>
               <a:rPr lang="zh-CN" altLang="en-US" sz="2800" dirty="0">
                 <a:latin typeface="icomoon" charset="0"/>
-                <a:ea typeface="Yu Gothic UI Semibold" panose="020B0700000000000000" charset="-128"/>
+                <a:ea typeface="Yu Gothic UI Semibold" charset="-128"/>
               </a:rPr>
               <a:t>          </a:t>
             </a:r>
             <a:r>
               <a:rPr lang="zh-CN" altLang="en-US" sz="2800" u="sng" dirty="0">
                 <a:latin typeface="icomoon" charset="0"/>
-                <a:ea typeface="Yu Gothic UI Semibold" panose="020B0700000000000000" charset="-128"/>
+                <a:ea typeface="Yu Gothic UI Semibold" charset="-128"/>
               </a:rPr>
               <a:t>                     </a:t>
             </a:r>
             <a:endParaRPr lang="zh-CN" altLang="en-US" sz="2800" u="sng" dirty="0">
               <a:latin typeface="icomoon" charset="0"/>
-              <a:ea typeface="Yu Gothic UI Semibold" panose="020B0700000000000000" charset="-128"/>
+              <a:ea typeface="Yu Gothic UI Semibold" charset="-128"/>
             </a:endParaRPr>
           </a:p>
         </p:txBody>
@@ -15796,8 +15789,8 @@
                     <a:lumMod val="75000"/>
                   </a:schemeClr>
                 </a:solidFill>
-                <a:latin typeface="Arial" panose="020B0604020202020204" pitchFamily="34" charset="0"/>
-                <a:ea typeface="Arial" panose="020B0604020202020204" pitchFamily="34" charset="0"/>
+                <a:latin typeface="Arial" pitchFamily="34" charset="0"/>
+                <a:ea typeface="Arial" pitchFamily="34" charset="0"/>
               </a:rPr>
               <a:t>Part 1</a:t>
             </a:r>
@@ -15807,8 +15800,8 @@
                   <a:lumMod val="75000"/>
                 </a:schemeClr>
               </a:solidFill>
-              <a:latin typeface="Arial" panose="020B0604020202020204" pitchFamily="34" charset="0"/>
-              <a:ea typeface="Arial" panose="020B0604020202020204" pitchFamily="34" charset="0"/>
+              <a:latin typeface="Arial" pitchFamily="34" charset="0"/>
+              <a:ea typeface="Arial" pitchFamily="34" charset="0"/>
             </a:endParaRPr>
           </a:p>
         </p:txBody>
@@ -15843,8 +15836,8 @@
                     <a:lumMod val="75000"/>
                   </a:schemeClr>
                 </a:solidFill>
-                <a:latin typeface="微软雅黑 Light" panose="020B0502040204020203" charset="-122"/>
-                <a:ea typeface="微软雅黑 Light" panose="020B0502040204020203" charset="-122"/>
+                <a:latin typeface="微软雅黑 Light" charset="-122"/>
+                <a:ea typeface="微软雅黑 Light" charset="-122"/>
               </a:rPr>
               <a:t>   </a:t>
             </a:r>
@@ -15854,8 +15847,8 @@
                   <a:lumMod val="75000"/>
                 </a:schemeClr>
               </a:solidFill>
-              <a:latin typeface="Comic Sans MS" panose="030F0702030302020204" charset="0"/>
-              <a:ea typeface="微软雅黑 Light" panose="020B0502040204020203" charset="-122"/>
+              <a:latin typeface="Comic Sans MS" charset="0"/>
+              <a:ea typeface="微软雅黑 Light" charset="-122"/>
             </a:endParaRPr>
           </a:p>
         </p:txBody>
@@ -16255,8 +16248,8 @@
                 <a:solidFill>
                   <a:schemeClr val="bg1"/>
                 </a:solidFill>
-                <a:latin typeface="Arial" panose="020B0604020202020204" pitchFamily="34" charset="0"/>
-                <a:ea typeface="Arial" panose="020B0604020202020204" pitchFamily="34" charset="0"/>
+                <a:latin typeface="Arial" pitchFamily="34" charset="0"/>
+                <a:ea typeface="Arial" pitchFamily="34" charset="0"/>
                 <a:sym typeface="+mn-ea"/>
               </a:rPr>
               <a:t> </a:t>
@@ -16266,8 +16259,8 @@
                 <a:solidFill>
                   <a:schemeClr val="bg1"/>
                 </a:solidFill>
-                <a:latin typeface="Arial" panose="020B0604020202020204" pitchFamily="34" charset="0"/>
-                <a:ea typeface="Arial" panose="020B0604020202020204" pitchFamily="34" charset="0"/>
+                <a:latin typeface="Arial" pitchFamily="34" charset="0"/>
+                <a:ea typeface="Arial" pitchFamily="34" charset="0"/>
                 <a:sym typeface="+mn-ea"/>
               </a:rPr>
               <a:t>YahBoom     </a:t>
@@ -16277,8 +16270,8 @@
                 <a:solidFill>
                   <a:schemeClr val="bg1"/>
                 </a:solidFill>
-                <a:latin typeface="微软雅黑" panose="020B0503020204020204" charset="-122"/>
-                <a:ea typeface="微软雅黑" panose="020B0503020204020204" charset="-122"/>
+                <a:latin typeface="微软雅黑" charset="-122"/>
+                <a:ea typeface="微软雅黑" charset="-122"/>
                 <a:sym typeface="+mn-ea"/>
               </a:rPr>
               <a:t>Croco:Kit </a:t>
@@ -16288,8 +16281,8 @@
                 <a:solidFill>
                   <a:schemeClr val="bg1"/>
                 </a:solidFill>
-                <a:latin typeface="Arial" panose="020B0604020202020204" pitchFamily="34" charset="0"/>
-                <a:ea typeface="Arial" panose="020B0604020202020204" pitchFamily="34" charset="0"/>
+                <a:latin typeface="Arial" pitchFamily="34" charset="0"/>
+                <a:ea typeface="Arial" pitchFamily="34" charset="0"/>
                 <a:sym typeface="+mn-ea"/>
               </a:rPr>
               <a:t>tutorial</a:t>
@@ -16550,8 +16543,8 @@
                     <a:lumMod val="75000"/>
                   </a:schemeClr>
                 </a:solidFill>
-                <a:latin typeface="Arial" panose="020B0604020202020204" pitchFamily="34" charset="0"/>
-                <a:ea typeface="Arial" panose="020B0604020202020204" pitchFamily="34" charset="0"/>
+                <a:latin typeface="Arial" pitchFamily="34" charset="0"/>
+                <a:ea typeface="Arial" pitchFamily="34" charset="0"/>
               </a:rPr>
               <a:t>micro:bit</a:t>
             </a:r>
@@ -16561,8 +16554,8 @@
                   <a:lumMod val="75000"/>
                 </a:schemeClr>
               </a:solidFill>
-              <a:latin typeface="Arial" panose="020B0604020202020204" pitchFamily="34" charset="0"/>
-              <a:ea typeface="Arial" panose="020B0604020202020204" pitchFamily="34" charset="0"/>
+              <a:latin typeface="Arial" pitchFamily="34" charset="0"/>
+              <a:ea typeface="Arial" pitchFamily="34" charset="0"/>
             </a:endParaRPr>
           </a:p>
           <a:p>
@@ -16574,8 +16567,8 @@
                     <a:lumMod val="75000"/>
                   </a:schemeClr>
                 </a:solidFill>
-                <a:latin typeface="Arial" panose="020B0604020202020204" pitchFamily="34" charset="0"/>
-                <a:ea typeface="Arial" panose="020B0604020202020204" pitchFamily="34" charset="0"/>
+                <a:latin typeface="Arial" pitchFamily="34" charset="0"/>
+                <a:ea typeface="Arial" pitchFamily="34" charset="0"/>
               </a:rPr>
               <a:t>features</a:t>
             </a:r>
@@ -16585,36 +16578,12 @@
                   <a:lumMod val="75000"/>
                 </a:schemeClr>
               </a:solidFill>
-              <a:latin typeface="Arial" panose="020B0604020202020204" pitchFamily="34" charset="0"/>
-              <a:ea typeface="Arial" panose="020B0604020202020204" pitchFamily="34" charset="0"/>
+              <a:latin typeface="Arial" pitchFamily="34" charset="0"/>
+              <a:ea typeface="Arial" pitchFamily="34" charset="0"/>
             </a:endParaRPr>
           </a:p>
         </p:txBody>
       </p:sp>
-      <p:pic>
-        <p:nvPicPr>
-          <p:cNvPr id="2" name="图片 1"/>
-          <p:cNvPicPr>
-            <a:picLocks noChangeAspect="1"/>
-          </p:cNvPicPr>
-          <p:nvPr/>
-        </p:nvPicPr>
-        <p:blipFill>
-          <a:blip r:embed="rId1"/>
-          <a:stretch>
-            <a:fillRect/>
-          </a:stretch>
-        </p:blipFill>
-        <p:spPr>
-          <a:xfrm>
-            <a:off x="2757170" y="1150620"/>
-            <a:ext cx="8799830" cy="4590415"/>
-          </a:xfrm>
-          <a:prstGeom prst="rect">
-            <a:avLst/>
-          </a:prstGeom>
-        </p:spPr>
-      </p:pic>
       <p:sp>
         <p:nvSpPr>
           <p:cNvPr id="3" name="文本框 2"/>
@@ -16652,32 +16621,56 @@
                 <a:solidFill>
                   <a:schemeClr val="bg1"/>
                 </a:solidFill>
-                <a:latin typeface="微软雅黑" panose="020B0503020204020204" charset="-122"/>
-                <a:ea typeface="微软雅黑" panose="020B0503020204020204" charset="-122"/>
+                <a:latin typeface="微软雅黑" charset="-122"/>
+                <a:ea typeface="微软雅黑" charset="-122"/>
               </a:rPr>
               <a:t>Preparation before class</a:t>
             </a:r>
             <a:r>
               <a:rPr lang="zh-CN" altLang="en-US" sz="2800" dirty="0">
                 <a:latin typeface="icomoon" charset="0"/>
-                <a:ea typeface="Yu Gothic UI Semibold" panose="020B0700000000000000" charset="-128"/>
+                <a:ea typeface="Yu Gothic UI Semibold" charset="-128"/>
               </a:rPr>
               <a:t>          </a:t>
             </a:r>
             <a:r>
               <a:rPr lang="zh-CN" altLang="en-US" sz="2800" u="sng" dirty="0">
                 <a:latin typeface="icomoon" charset="0"/>
-                <a:ea typeface="Yu Gothic UI Semibold" panose="020B0700000000000000" charset="-128"/>
+                <a:ea typeface="Yu Gothic UI Semibold" charset="-128"/>
               </a:rPr>
               <a:t>                     </a:t>
             </a:r>
             <a:endParaRPr lang="zh-CN" altLang="en-US" sz="2800" u="sng" dirty="0">
               <a:latin typeface="icomoon" charset="0"/>
-              <a:ea typeface="Yu Gothic UI Semibold" panose="020B0700000000000000" charset="-128"/>
+              <a:ea typeface="Yu Gothic UI Semibold" charset="-128"/>
             </a:endParaRPr>
           </a:p>
         </p:txBody>
       </p:sp>
+      <p:pic>
+        <p:nvPicPr>
+          <p:cNvPr id="5" name="图片 4"/>
+          <p:cNvPicPr>
+            <a:picLocks noChangeAspect="1"/>
+          </p:cNvPicPr>
+          <p:nvPr/>
+        </p:nvPicPr>
+        <p:blipFill>
+          <a:blip r:embed="rId1"/>
+          <a:stretch>
+            <a:fillRect/>
+          </a:stretch>
+        </p:blipFill>
+        <p:spPr>
+          <a:xfrm>
+            <a:off x="2858135" y="1464945"/>
+            <a:ext cx="8515985" cy="3392170"/>
+          </a:xfrm>
+          <a:prstGeom prst="rect">
+            <a:avLst/>
+          </a:prstGeom>
+        </p:spPr>
+      </p:pic>
     </p:spTree>
   </p:cSld>
   <p:clrMapOvr>
@@ -16968,8 +16961,8 @@
                     <a:lumMod val="75000"/>
                   </a:schemeClr>
                 </a:solidFill>
-                <a:latin typeface="微软雅黑 Light" panose="020B0502040204020203" charset="-122"/>
-                <a:ea typeface="微软雅黑 Light" panose="020B0502040204020203" charset="-122"/>
+                <a:latin typeface="微软雅黑 Light" charset="-122"/>
+                <a:ea typeface="微软雅黑 Light" charset="-122"/>
               </a:rPr>
               <a:t>Part 2</a:t>
             </a:r>
@@ -16979,8 +16972,8 @@
                   <a:lumMod val="75000"/>
                 </a:schemeClr>
               </a:solidFill>
-              <a:latin typeface="微软雅黑 Light" panose="020B0502040204020203" charset="-122"/>
-              <a:ea typeface="微软雅黑 Light" panose="020B0502040204020203" charset="-122"/>
+              <a:latin typeface="微软雅黑 Light" charset="-122"/>
+              <a:ea typeface="微软雅黑 Light" charset="-122"/>
             </a:endParaRPr>
           </a:p>
         </p:txBody>
@@ -17380,8 +17373,8 @@
                 <a:solidFill>
                   <a:schemeClr val="bg1"/>
                 </a:solidFill>
-                <a:latin typeface="Arial" panose="020B0604020202020204" pitchFamily="34" charset="0"/>
-                <a:ea typeface="Arial" panose="020B0604020202020204" pitchFamily="34" charset="0"/>
+                <a:latin typeface="Arial" pitchFamily="34" charset="0"/>
+                <a:ea typeface="Arial" pitchFamily="34" charset="0"/>
                 <a:sym typeface="+mn-ea"/>
               </a:rPr>
               <a:t> </a:t>
@@ -17391,8 +17384,8 @@
                 <a:solidFill>
                   <a:schemeClr val="bg1"/>
                 </a:solidFill>
-                <a:latin typeface="Arial" panose="020B0604020202020204" pitchFamily="34" charset="0"/>
-                <a:ea typeface="Arial" panose="020B0604020202020204" pitchFamily="34" charset="0"/>
+                <a:latin typeface="Arial" pitchFamily="34" charset="0"/>
+                <a:ea typeface="Arial" pitchFamily="34" charset="0"/>
                 <a:sym typeface="+mn-ea"/>
               </a:rPr>
               <a:t>YahBoom     </a:t>
@@ -17402,8 +17395,8 @@
                 <a:solidFill>
                   <a:schemeClr val="bg1"/>
                 </a:solidFill>
-                <a:latin typeface="微软雅黑" panose="020B0503020204020204" charset="-122"/>
-                <a:ea typeface="微软雅黑" panose="020B0503020204020204" charset="-122"/>
+                <a:latin typeface="微软雅黑" charset="-122"/>
+                <a:ea typeface="微软雅黑" charset="-122"/>
                 <a:sym typeface="+mn-ea"/>
               </a:rPr>
               <a:t>Croco:Kit </a:t>
@@ -17413,8 +17406,8 @@
                 <a:solidFill>
                   <a:schemeClr val="bg1"/>
                 </a:solidFill>
-                <a:latin typeface="Arial" panose="020B0604020202020204" pitchFamily="34" charset="0"/>
-                <a:ea typeface="Arial" panose="020B0604020202020204" pitchFamily="34" charset="0"/>
+                <a:latin typeface="Arial" pitchFamily="34" charset="0"/>
+                <a:ea typeface="Arial" pitchFamily="34" charset="0"/>
                 <a:sym typeface="+mn-ea"/>
               </a:rPr>
               <a:t>tutorial</a:t>
@@ -17456,8 +17449,8 @@
                     </a:srgbClr>
                   </a:outerShdw>
                 </a:effectLst>
-                <a:latin typeface="Arial" panose="020B0604020202020204" pitchFamily="34" charset="0"/>
-                <a:ea typeface="Arial" panose="020B0604020202020204" pitchFamily="34" charset="0"/>
+                <a:latin typeface="Arial" pitchFamily="34" charset="0"/>
+                <a:ea typeface="Arial" pitchFamily="34" charset="0"/>
               </a:rPr>
               <a:t>       1.</a:t>
             </a:r>
@@ -17473,8 +17466,8 @@
                     </a:srgbClr>
                   </a:outerShdw>
                 </a:effectLst>
-                <a:latin typeface="Arial" panose="020B0604020202020204" pitchFamily="34" charset="0"/>
-                <a:ea typeface="Arial" panose="020B0604020202020204" pitchFamily="34" charset="0"/>
+                <a:latin typeface="Arial" pitchFamily="34" charset="0"/>
+                <a:ea typeface="Arial" pitchFamily="34" charset="0"/>
               </a:rPr>
               <a:t>First, you use the </a:t>
             </a:r>
@@ -17490,8 +17483,8 @@
                     </a:srgbClr>
                   </a:outerShdw>
                 </a:effectLst>
-                <a:latin typeface="Arial" panose="020B0604020202020204" pitchFamily="34" charset="0"/>
-                <a:ea typeface="Arial" panose="020B0604020202020204" pitchFamily="34" charset="0"/>
+                <a:latin typeface="Arial" pitchFamily="34" charset="0"/>
+                <a:ea typeface="Arial" pitchFamily="34" charset="0"/>
               </a:rPr>
               <a:t>USB cable</a:t>
             </a:r>
@@ -17507,8 +17500,8 @@
                     </a:srgbClr>
                   </a:outerShdw>
                 </a:effectLst>
-                <a:latin typeface="Arial" panose="020B0604020202020204" pitchFamily="34" charset="0"/>
-                <a:ea typeface="Arial" panose="020B0604020202020204" pitchFamily="34" charset="0"/>
+                <a:latin typeface="Arial" pitchFamily="34" charset="0"/>
+                <a:ea typeface="Arial" pitchFamily="34" charset="0"/>
               </a:rPr>
               <a:t> to connect the micro:bit to the computer</a:t>
             </a:r>
@@ -17524,8 +17517,8 @@
                     </a:srgbClr>
                   </a:outerShdw>
                 </a:effectLst>
-                <a:latin typeface="Arial" panose="020B0604020202020204" pitchFamily="34" charset="0"/>
-                <a:ea typeface="Arial" panose="020B0604020202020204" pitchFamily="34" charset="0"/>
+                <a:latin typeface="Arial" pitchFamily="34" charset="0"/>
+                <a:ea typeface="Arial" pitchFamily="34" charset="0"/>
               </a:rPr>
               <a:t>, a</a:t>
             </a:r>
@@ -17541,8 +17534,8 @@
                     </a:srgbClr>
                   </a:outerShdw>
                 </a:effectLst>
-                <a:latin typeface="Arial" panose="020B0604020202020204" pitchFamily="34" charset="0"/>
-                <a:ea typeface="Arial" panose="020B0604020202020204" pitchFamily="34" charset="0"/>
+                <a:latin typeface="Arial" pitchFamily="34" charset="0"/>
+                <a:ea typeface="Arial" pitchFamily="34" charset="0"/>
               </a:rPr>
               <a:t>t this point, the computer will have a micro:bit U disk.</a:t>
             </a:r>
@@ -17558,8 +17551,8 @@
                     </a:srgbClr>
                   </a:outerShdw>
                 </a:effectLst>
-                <a:latin typeface="Arial" panose="020B0604020202020204" pitchFamily="34" charset="0"/>
-                <a:ea typeface="Arial" panose="020B0604020202020204" pitchFamily="34" charset="0"/>
+                <a:latin typeface="Arial" pitchFamily="34" charset="0"/>
+                <a:ea typeface="Arial" pitchFamily="34" charset="0"/>
               </a:rPr>
               <a:t> </a:t>
             </a:r>
@@ -17575,8 +17568,8 @@
                     </a:srgbClr>
                   </a:outerShdw>
                 </a:effectLst>
-                <a:latin typeface="Arial" panose="020B0604020202020204" pitchFamily="34" charset="0"/>
-                <a:ea typeface="Arial" panose="020B0604020202020204" pitchFamily="34" charset="0"/>
+                <a:latin typeface="Arial" pitchFamily="34" charset="0"/>
+                <a:ea typeface="Arial" pitchFamily="34" charset="0"/>
               </a:rPr>
               <a:t>Open it,  click micro:bit</a:t>
             </a:r>
@@ -17592,8 +17585,8 @@
                     </a:srgbClr>
                   </a:outerShdw>
                 </a:effectLst>
-                <a:latin typeface="Arial" panose="020B0604020202020204" pitchFamily="34" charset="0"/>
-                <a:ea typeface="Arial" panose="020B0604020202020204" pitchFamily="34" charset="0"/>
+                <a:latin typeface="Arial" pitchFamily="34" charset="0"/>
+                <a:ea typeface="Arial" pitchFamily="34" charset="0"/>
               </a:rPr>
               <a:t> </a:t>
             </a:r>
@@ -17609,8 +17602,8 @@
                     </a:srgbClr>
                   </a:outerShdw>
                 </a:effectLst>
-                <a:latin typeface="Arial" panose="020B0604020202020204" pitchFamily="34" charset="0"/>
-                <a:ea typeface="Arial" panose="020B0604020202020204" pitchFamily="34" charset="0"/>
+                <a:latin typeface="Arial" pitchFamily="34" charset="0"/>
+                <a:ea typeface="Arial" pitchFamily="34" charset="0"/>
               </a:rPr>
               <a:t>website, then entered the micro:bit</a:t>
             </a:r>
@@ -17626,8 +17619,8 @@
                     </a:srgbClr>
                   </a:outerShdw>
                 </a:effectLst>
-                <a:latin typeface="Arial" panose="020B0604020202020204" pitchFamily="34" charset="0"/>
-                <a:ea typeface="Arial" panose="020B0604020202020204" pitchFamily="34" charset="0"/>
+                <a:latin typeface="Arial" pitchFamily="34" charset="0"/>
+                <a:ea typeface="Arial" pitchFamily="34" charset="0"/>
               </a:rPr>
               <a:t> </a:t>
             </a:r>
@@ -17643,8 +17636,8 @@
                     </a:srgbClr>
                   </a:outerShdw>
                 </a:effectLst>
-                <a:latin typeface="Arial" panose="020B0604020202020204" pitchFamily="34" charset="0"/>
-                <a:ea typeface="Arial" panose="020B0604020202020204" pitchFamily="34" charset="0"/>
+                <a:latin typeface="Arial" pitchFamily="34" charset="0"/>
+                <a:ea typeface="Arial" pitchFamily="34" charset="0"/>
               </a:rPr>
               <a:t>website </a:t>
             </a:r>
@@ -17659,8 +17652,8 @@
                   </a:srgbClr>
                 </a:outerShdw>
               </a:effectLst>
-              <a:latin typeface="Arial" panose="020B0604020202020204" pitchFamily="34" charset="0"/>
-              <a:ea typeface="Arial" panose="020B0604020202020204" pitchFamily="34" charset="0"/>
+              <a:latin typeface="Arial" pitchFamily="34" charset="0"/>
+              <a:ea typeface="Arial" pitchFamily="34" charset="0"/>
             </a:endParaRPr>
           </a:p>
         </p:txBody>
@@ -17917,8 +17910,8 @@
                     <a:lumMod val="75000"/>
                   </a:schemeClr>
                 </a:solidFill>
-                <a:latin typeface="Arial" panose="020B0604020202020204" pitchFamily="34" charset="0"/>
-                <a:ea typeface="Arial" panose="020B0604020202020204" pitchFamily="34" charset="0"/>
+                <a:latin typeface="Arial" pitchFamily="34" charset="0"/>
+                <a:ea typeface="Arial" pitchFamily="34" charset="0"/>
               </a:rPr>
               <a:t>How to open a programming web page?</a:t>
             </a:r>
@@ -17928,8 +17921,8 @@
                   <a:lumMod val="75000"/>
                 </a:schemeClr>
               </a:solidFill>
-              <a:latin typeface="Arial" panose="020B0604020202020204" pitchFamily="34" charset="0"/>
-              <a:ea typeface="Arial" panose="020B0604020202020204" pitchFamily="34" charset="0"/>
+              <a:latin typeface="Arial" pitchFamily="34" charset="0"/>
+              <a:ea typeface="Arial" pitchFamily="34" charset="0"/>
             </a:endParaRPr>
           </a:p>
         </p:txBody>
@@ -18019,28 +18012,28 @@
                 <a:solidFill>
                   <a:schemeClr val="bg1"/>
                 </a:solidFill>
-                <a:latin typeface="微软雅黑" panose="020B0503020204020204" charset="-122"/>
-                <a:ea typeface="微软雅黑" panose="020B0503020204020204" charset="-122"/>
+                <a:latin typeface="微软雅黑" charset="-122"/>
+                <a:ea typeface="微软雅黑" charset="-122"/>
               </a:rPr>
               <a:t>Preparation before class</a:t>
             </a:r>
             <a:r>
               <a:rPr lang="zh-CN" altLang="en-US" sz="2800" dirty="0">
                 <a:latin typeface="icomoon" charset="0"/>
-                <a:ea typeface="Yu Gothic UI Semibold" panose="020B0700000000000000" charset="-128"/>
+                <a:ea typeface="Yu Gothic UI Semibold" charset="-128"/>
               </a:rPr>
               <a:t>          </a:t>
             </a:r>
             <a:r>
               <a:rPr lang="zh-CN" altLang="en-US" sz="2800" u="sng" dirty="0">
                 <a:latin typeface="icomoon" charset="0"/>
-                <a:ea typeface="Yu Gothic UI Semibold" panose="020B0700000000000000" charset="-128"/>
+                <a:ea typeface="Yu Gothic UI Semibold" charset="-128"/>
               </a:rPr>
               <a:t>                     </a:t>
             </a:r>
             <a:endParaRPr lang="zh-CN" altLang="en-US" sz="2800" u="sng" dirty="0">
               <a:latin typeface="icomoon" charset="0"/>
-              <a:ea typeface="Yu Gothic UI Semibold" panose="020B0700000000000000" charset="-128"/>
+              <a:ea typeface="Yu Gothic UI Semibold" charset="-128"/>
             </a:endParaRPr>
           </a:p>
         </p:txBody>
@@ -18335,8 +18328,8 @@
                     <a:lumMod val="75000"/>
                   </a:schemeClr>
                 </a:solidFill>
-                <a:latin typeface="Arial" panose="020B0604020202020204" pitchFamily="34" charset="0"/>
-                <a:ea typeface="Arial" panose="020B0604020202020204" pitchFamily="34" charset="0"/>
+                <a:latin typeface="Arial" pitchFamily="34" charset="0"/>
+                <a:ea typeface="Arial" pitchFamily="34" charset="0"/>
               </a:rPr>
               <a:t>Part 2</a:t>
             </a:r>
@@ -18346,8 +18339,8 @@
                   <a:lumMod val="75000"/>
                 </a:schemeClr>
               </a:solidFill>
-              <a:latin typeface="Arial" panose="020B0604020202020204" pitchFamily="34" charset="0"/>
-              <a:ea typeface="Arial" panose="020B0604020202020204" pitchFamily="34" charset="0"/>
+              <a:latin typeface="Arial" pitchFamily="34" charset="0"/>
+              <a:ea typeface="Arial" pitchFamily="34" charset="0"/>
             </a:endParaRPr>
           </a:p>
         </p:txBody>
@@ -18747,8 +18740,8 @@
                 <a:solidFill>
                   <a:schemeClr val="bg1"/>
                 </a:solidFill>
-                <a:latin typeface="Arial" panose="020B0604020202020204" pitchFamily="34" charset="0"/>
-                <a:ea typeface="Arial" panose="020B0604020202020204" pitchFamily="34" charset="0"/>
+                <a:latin typeface="Arial" pitchFamily="34" charset="0"/>
+                <a:ea typeface="Arial" pitchFamily="34" charset="0"/>
                 <a:sym typeface="+mn-ea"/>
               </a:rPr>
               <a:t> </a:t>
@@ -18758,8 +18751,8 @@
                 <a:solidFill>
                   <a:schemeClr val="bg1"/>
                 </a:solidFill>
-                <a:latin typeface="Arial" panose="020B0604020202020204" pitchFamily="34" charset="0"/>
-                <a:ea typeface="Arial" panose="020B0604020202020204" pitchFamily="34" charset="0"/>
+                <a:latin typeface="Arial" pitchFamily="34" charset="0"/>
+                <a:ea typeface="Arial" pitchFamily="34" charset="0"/>
                 <a:sym typeface="+mn-ea"/>
               </a:rPr>
               <a:t>YahBoom     </a:t>
@@ -18769,8 +18762,8 @@
                 <a:solidFill>
                   <a:schemeClr val="bg1"/>
                 </a:solidFill>
-                <a:latin typeface="微软雅黑" panose="020B0503020204020204" charset="-122"/>
-                <a:ea typeface="微软雅黑" panose="020B0503020204020204" charset="-122"/>
+                <a:latin typeface="微软雅黑" charset="-122"/>
+                <a:ea typeface="微软雅黑" charset="-122"/>
                 <a:sym typeface="+mn-ea"/>
               </a:rPr>
               <a:t>Croco:Kit </a:t>
@@ -18780,8 +18773,8 @@
                 <a:solidFill>
                   <a:schemeClr val="bg1"/>
                 </a:solidFill>
-                <a:latin typeface="Arial" panose="020B0604020202020204" pitchFamily="34" charset="0"/>
-                <a:ea typeface="Arial" panose="020B0604020202020204" pitchFamily="34" charset="0"/>
+                <a:latin typeface="Arial" pitchFamily="34" charset="0"/>
+                <a:ea typeface="Arial" pitchFamily="34" charset="0"/>
                 <a:sym typeface="+mn-ea"/>
               </a:rPr>
               <a:t>tutorial</a:t>
@@ -18818,8 +18811,8 @@
                   <a:lumMod val="75000"/>
                 </a:schemeClr>
               </a:solidFill>
-              <a:latin typeface="微软雅黑 Light" panose="020B0502040204020203" charset="-122"/>
-              <a:ea typeface="微软雅黑 Light" panose="020B0502040204020203" charset="-122"/>
+              <a:latin typeface="微软雅黑 Light" charset="-122"/>
+              <a:ea typeface="微软雅黑 Light" charset="-122"/>
             </a:endParaRPr>
           </a:p>
         </p:txBody>
@@ -19080,8 +19073,8 @@
                     </a:srgbClr>
                   </a:outerShdw>
                 </a:effectLst>
-                <a:latin typeface="Arial" panose="020B0604020202020204" pitchFamily="34" charset="0"/>
-                <a:ea typeface="Arial" panose="020B0604020202020204" pitchFamily="34" charset="0"/>
+                <a:latin typeface="Arial" pitchFamily="34" charset="0"/>
+                <a:ea typeface="Arial" pitchFamily="34" charset="0"/>
               </a:rPr>
               <a:t>       2.</a:t>
             </a:r>
@@ -19097,8 +19090,8 @@
                     </a:srgbClr>
                   </a:outerShdw>
                 </a:effectLst>
-                <a:latin typeface="Arial" panose="020B0604020202020204" pitchFamily="34" charset="0"/>
-                <a:ea typeface="Arial" panose="020B0604020202020204" pitchFamily="34" charset="0"/>
+                <a:latin typeface="Arial" pitchFamily="34" charset="0"/>
+                <a:ea typeface="Arial" pitchFamily="34" charset="0"/>
               </a:rPr>
               <a:t>After entering the micro:bit, click </a:t>
             </a:r>
@@ -19114,8 +19107,8 @@
                     </a:srgbClr>
                   </a:outerShdw>
                 </a:effectLst>
-                <a:latin typeface="Arial" panose="020B0604020202020204" pitchFamily="34" charset="0"/>
-                <a:ea typeface="Arial" panose="020B0604020202020204" pitchFamily="34" charset="0"/>
+                <a:latin typeface="Arial" pitchFamily="34" charset="0"/>
+                <a:ea typeface="Arial" pitchFamily="34" charset="0"/>
               </a:rPr>
               <a:t>Let's Code</a:t>
             </a:r>
@@ -19130,8 +19123,8 @@
                   </a:srgbClr>
                 </a:outerShdw>
               </a:effectLst>
-              <a:latin typeface="Arial" panose="020B0604020202020204" pitchFamily="34" charset="0"/>
-              <a:ea typeface="Arial" panose="020B0604020202020204" pitchFamily="34" charset="0"/>
+              <a:latin typeface="Arial" pitchFamily="34" charset="0"/>
+              <a:ea typeface="Arial" pitchFamily="34" charset="0"/>
             </a:endParaRPr>
           </a:p>
         </p:txBody>
@@ -19189,8 +19182,8 @@
                     <a:lumMod val="75000"/>
                   </a:schemeClr>
                 </a:solidFill>
-                <a:latin typeface="Arial" panose="020B0604020202020204" pitchFamily="34" charset="0"/>
-                <a:ea typeface="Arial" panose="020B0604020202020204" pitchFamily="34" charset="0"/>
+                <a:latin typeface="Arial" pitchFamily="34" charset="0"/>
+                <a:ea typeface="Arial" pitchFamily="34" charset="0"/>
               </a:rPr>
               <a:t>How to open a programming web page?</a:t>
             </a:r>
@@ -19200,8 +19193,8 @@
                   <a:lumMod val="75000"/>
                 </a:schemeClr>
               </a:solidFill>
-              <a:latin typeface="Arial" panose="020B0604020202020204" pitchFamily="34" charset="0"/>
-              <a:ea typeface="Arial" panose="020B0604020202020204" pitchFamily="34" charset="0"/>
+              <a:latin typeface="Arial" pitchFamily="34" charset="0"/>
+              <a:ea typeface="Arial" pitchFamily="34" charset="0"/>
             </a:endParaRPr>
           </a:p>
         </p:txBody>
@@ -19243,28 +19236,28 @@
                 <a:solidFill>
                   <a:schemeClr val="bg1"/>
                 </a:solidFill>
-                <a:latin typeface="微软雅黑" panose="020B0503020204020204" charset="-122"/>
-                <a:ea typeface="微软雅黑" panose="020B0503020204020204" charset="-122"/>
+                <a:latin typeface="微软雅黑" charset="-122"/>
+                <a:ea typeface="微软雅黑" charset="-122"/>
               </a:rPr>
               <a:t>Preparation before class</a:t>
             </a:r>
             <a:r>
               <a:rPr lang="zh-CN" altLang="en-US" sz="2800" dirty="0">
                 <a:latin typeface="icomoon" charset="0"/>
-                <a:ea typeface="Yu Gothic UI Semibold" panose="020B0700000000000000" charset="-128"/>
+                <a:ea typeface="Yu Gothic UI Semibold" charset="-128"/>
               </a:rPr>
               <a:t>          </a:t>
             </a:r>
             <a:r>
               <a:rPr lang="zh-CN" altLang="en-US" sz="2800" u="sng" dirty="0">
                 <a:latin typeface="icomoon" charset="0"/>
-                <a:ea typeface="Yu Gothic UI Semibold" panose="020B0700000000000000" charset="-128"/>
+                <a:ea typeface="Yu Gothic UI Semibold" charset="-128"/>
               </a:rPr>
               <a:t>                     </a:t>
             </a:r>
             <a:endParaRPr lang="zh-CN" altLang="en-US" sz="2800" u="sng" dirty="0">
               <a:latin typeface="icomoon" charset="0"/>
-              <a:ea typeface="Yu Gothic UI Semibold" panose="020B0700000000000000" charset="-128"/>
+              <a:ea typeface="Yu Gothic UI Semibold" charset="-128"/>
             </a:endParaRPr>
           </a:p>
         </p:txBody>
@@ -19326,8 +19319,8 @@
                     <a:lumMod val="75000"/>
                   </a:schemeClr>
                 </a:solidFill>
-                <a:latin typeface="Arial" panose="020B0604020202020204" pitchFamily="34" charset="0"/>
-                <a:ea typeface="Arial" panose="020B0604020202020204" pitchFamily="34" charset="0"/>
+                <a:latin typeface="Arial" pitchFamily="34" charset="0"/>
+                <a:ea typeface="Arial" pitchFamily="34" charset="0"/>
               </a:rPr>
               <a:t>Part 2</a:t>
             </a:r>
@@ -19337,8 +19330,8 @@
                   <a:lumMod val="75000"/>
                 </a:schemeClr>
               </a:solidFill>
-              <a:latin typeface="Arial" panose="020B0604020202020204" pitchFamily="34" charset="0"/>
-              <a:ea typeface="Arial" panose="020B0604020202020204" pitchFamily="34" charset="0"/>
+              <a:latin typeface="Arial" pitchFamily="34" charset="0"/>
+              <a:ea typeface="Arial" pitchFamily="34" charset="0"/>
             </a:endParaRPr>
           </a:p>
         </p:txBody>
@@ -19961,8 +19954,8 @@
                 <a:solidFill>
                   <a:schemeClr val="bg1"/>
                 </a:solidFill>
-                <a:latin typeface="Arial" panose="020B0604020202020204" pitchFamily="34" charset="0"/>
-                <a:ea typeface="Arial" panose="020B0604020202020204" pitchFamily="34" charset="0"/>
+                <a:latin typeface="Arial" pitchFamily="34" charset="0"/>
+                <a:ea typeface="Arial" pitchFamily="34" charset="0"/>
                 <a:sym typeface="+mn-ea"/>
               </a:rPr>
               <a:t> </a:t>
@@ -19972,8 +19965,8 @@
                 <a:solidFill>
                   <a:schemeClr val="bg1"/>
                 </a:solidFill>
-                <a:latin typeface="Arial" panose="020B0604020202020204" pitchFamily="34" charset="0"/>
-                <a:ea typeface="Arial" panose="020B0604020202020204" pitchFamily="34" charset="0"/>
+                <a:latin typeface="Arial" pitchFamily="34" charset="0"/>
+                <a:ea typeface="Arial" pitchFamily="34" charset="0"/>
                 <a:sym typeface="+mn-ea"/>
               </a:rPr>
               <a:t>YahBoom     </a:t>
@@ -19983,8 +19976,8 @@
                 <a:solidFill>
                   <a:schemeClr val="bg1"/>
                 </a:solidFill>
-                <a:latin typeface="微软雅黑" panose="020B0503020204020204" charset="-122"/>
-                <a:ea typeface="微软雅黑" panose="020B0503020204020204" charset="-122"/>
+                <a:latin typeface="微软雅黑" charset="-122"/>
+                <a:ea typeface="微软雅黑" charset="-122"/>
                 <a:sym typeface="+mn-ea"/>
               </a:rPr>
               <a:t>Croco:Kit </a:t>
@@ -19994,8 +19987,8 @@
                 <a:solidFill>
                   <a:schemeClr val="bg1"/>
                 </a:solidFill>
-                <a:latin typeface="Arial" panose="020B0604020202020204" pitchFamily="34" charset="0"/>
-                <a:ea typeface="Arial" panose="020B0604020202020204" pitchFamily="34" charset="0"/>
+                <a:latin typeface="Arial" pitchFamily="34" charset="0"/>
+                <a:ea typeface="Arial" pitchFamily="34" charset="0"/>
                 <a:sym typeface="+mn-ea"/>
               </a:rPr>
               <a:t>tutorial</a:t>
@@ -20038,8 +20031,8 @@
                     </a:srgbClr>
                   </a:outerShdw>
                 </a:effectLst>
-                <a:latin typeface="Arial" panose="020B0604020202020204" pitchFamily="34" charset="0"/>
-                <a:ea typeface="Arial" panose="020B0604020202020204" pitchFamily="34" charset="0"/>
+                <a:latin typeface="Arial" pitchFamily="34" charset="0"/>
+                <a:ea typeface="Arial" pitchFamily="34" charset="0"/>
                 <a:sym typeface="+mn-ea"/>
               </a:rPr>
               <a:t>       </a:t>
@@ -20056,8 +20049,8 @@
                     </a:srgbClr>
                   </a:outerShdw>
                 </a:effectLst>
-                <a:latin typeface="Arial" panose="020B0604020202020204" pitchFamily="34" charset="0"/>
-                <a:ea typeface="Arial" panose="020B0604020202020204" pitchFamily="34" charset="0"/>
+                <a:latin typeface="Arial" pitchFamily="34" charset="0"/>
+                <a:ea typeface="Arial" pitchFamily="34" charset="0"/>
                 <a:sym typeface="+mn-ea"/>
               </a:rPr>
               <a:t>When you get into a new page, click on the screen below [</a:t>
@@ -20074,8 +20067,8 @@
                     </a:srgbClr>
                   </a:outerShdw>
                 </a:effectLst>
-                <a:latin typeface="Arial" panose="020B0604020202020204" pitchFamily="34" charset="0"/>
-                <a:ea typeface="Arial" panose="020B0604020202020204" pitchFamily="34" charset="0"/>
+                <a:latin typeface="Arial" pitchFamily="34" charset="0"/>
+                <a:ea typeface="Arial" pitchFamily="34" charset="0"/>
                 <a:sym typeface="+mn-ea"/>
               </a:rPr>
               <a:t>L</a:t>
@@ -20092,8 +20085,8 @@
                     </a:srgbClr>
                   </a:outerShdw>
                 </a:effectLst>
-                <a:latin typeface="Arial" panose="020B0604020202020204" pitchFamily="34" charset="0"/>
-                <a:ea typeface="Arial" panose="020B0604020202020204" pitchFamily="34" charset="0"/>
+                <a:latin typeface="Arial" pitchFamily="34" charset="0"/>
+                <a:ea typeface="Arial" pitchFamily="34" charset="0"/>
                 <a:sym typeface="+mn-ea"/>
               </a:rPr>
               <a:t>et's </a:t>
@@ -20110,8 +20103,8 @@
                     </a:srgbClr>
                   </a:outerShdw>
                 </a:effectLst>
-                <a:latin typeface="Arial" panose="020B0604020202020204" pitchFamily="34" charset="0"/>
-                <a:ea typeface="Arial" panose="020B0604020202020204" pitchFamily="34" charset="0"/>
+                <a:latin typeface="Arial" pitchFamily="34" charset="0"/>
+                <a:ea typeface="Arial" pitchFamily="34" charset="0"/>
                 <a:sym typeface="+mn-ea"/>
               </a:rPr>
               <a:t>Code</a:t>
@@ -20128,8 +20121,8 @@
                     </a:srgbClr>
                   </a:outerShdw>
                 </a:effectLst>
-                <a:latin typeface="Arial" panose="020B0604020202020204" pitchFamily="34" charset="0"/>
-                <a:ea typeface="Arial" panose="020B0604020202020204" pitchFamily="34" charset="0"/>
+                <a:latin typeface="Arial" pitchFamily="34" charset="0"/>
+                <a:ea typeface="Arial" pitchFamily="34" charset="0"/>
                 <a:sym typeface="+mn-ea"/>
               </a:rPr>
               <a:t>],</a:t>
@@ -20145,8 +20138,8 @@
                   </a:srgbClr>
                 </a:outerShdw>
               </a:effectLst>
-              <a:latin typeface="Arial" panose="020B0604020202020204" pitchFamily="34" charset="0"/>
-              <a:ea typeface="Arial" panose="020B0604020202020204" pitchFamily="34" charset="0"/>
+              <a:latin typeface="Arial" pitchFamily="34" charset="0"/>
+              <a:ea typeface="Arial" pitchFamily="34" charset="0"/>
               <a:sym typeface="+mn-ea"/>
             </a:endParaRPr>
           </a:p>
@@ -20164,8 +20157,8 @@
                     </a:srgbClr>
                   </a:outerShdw>
                 </a:effectLst>
-                <a:latin typeface="Arial" panose="020B0604020202020204" pitchFamily="34" charset="0"/>
-                <a:ea typeface="Arial" panose="020B0604020202020204" pitchFamily="34" charset="0"/>
+                <a:latin typeface="Arial" pitchFamily="34" charset="0"/>
+                <a:ea typeface="Arial" pitchFamily="34" charset="0"/>
                 <a:sym typeface="+mn-ea"/>
               </a:rPr>
               <a:t>You can get into the programming page.</a:t>
@@ -20181,8 +20174,8 @@
                   </a:srgbClr>
                 </a:outerShdw>
               </a:effectLst>
-              <a:latin typeface="Arial" panose="020B0604020202020204" pitchFamily="34" charset="0"/>
-              <a:ea typeface="Arial" panose="020B0604020202020204" pitchFamily="34" charset="0"/>
+              <a:latin typeface="Arial" pitchFamily="34" charset="0"/>
+              <a:ea typeface="Arial" pitchFamily="34" charset="0"/>
               <a:sym typeface="+mn-ea"/>
             </a:endParaRPr>
           </a:p>
@@ -20241,8 +20234,8 @@
                     <a:lumMod val="75000"/>
                   </a:schemeClr>
                 </a:solidFill>
-                <a:latin typeface="Arial" panose="020B0604020202020204" pitchFamily="34" charset="0"/>
-                <a:ea typeface="Arial" panose="020B0604020202020204" pitchFamily="34" charset="0"/>
+                <a:latin typeface="Arial" pitchFamily="34" charset="0"/>
+                <a:ea typeface="Arial" pitchFamily="34" charset="0"/>
               </a:rPr>
               <a:t>How to open a programming web page?</a:t>
             </a:r>
@@ -20252,8 +20245,8 @@
                   <a:lumMod val="75000"/>
                 </a:schemeClr>
               </a:solidFill>
-              <a:latin typeface="Arial" panose="020B0604020202020204" pitchFamily="34" charset="0"/>
-              <a:ea typeface="Arial" panose="020B0604020202020204" pitchFamily="34" charset="0"/>
+              <a:latin typeface="Arial" pitchFamily="34" charset="0"/>
+              <a:ea typeface="Arial" pitchFamily="34" charset="0"/>
             </a:endParaRPr>
           </a:p>
         </p:txBody>
@@ -20295,28 +20288,28 @@
                 <a:solidFill>
                   <a:schemeClr val="bg1"/>
                 </a:solidFill>
-                <a:latin typeface="微软雅黑" panose="020B0503020204020204" charset="-122"/>
-                <a:ea typeface="微软雅黑" panose="020B0503020204020204" charset="-122"/>
+                <a:latin typeface="微软雅黑" charset="-122"/>
+                <a:ea typeface="微软雅黑" charset="-122"/>
               </a:rPr>
               <a:t>Preparation before class</a:t>
             </a:r>
             <a:r>
               <a:rPr lang="zh-CN" altLang="en-US" sz="2800" dirty="0">
                 <a:latin typeface="icomoon" charset="0"/>
-                <a:ea typeface="Yu Gothic UI Semibold" panose="020B0700000000000000" charset="-128"/>
+                <a:ea typeface="Yu Gothic UI Semibold" charset="-128"/>
               </a:rPr>
               <a:t>          </a:t>
             </a:r>
             <a:r>
               <a:rPr lang="zh-CN" altLang="en-US" sz="2800" u="sng" dirty="0">
                 <a:latin typeface="icomoon" charset="0"/>
-                <a:ea typeface="Yu Gothic UI Semibold" panose="020B0700000000000000" charset="-128"/>
+                <a:ea typeface="Yu Gothic UI Semibold" charset="-128"/>
               </a:rPr>
               <a:t>                     </a:t>
             </a:r>
             <a:endParaRPr lang="zh-CN" altLang="en-US" sz="2800" u="sng" dirty="0">
               <a:latin typeface="icomoon" charset="0"/>
-              <a:ea typeface="Yu Gothic UI Semibold" panose="020B0700000000000000" charset="-128"/>
+              <a:ea typeface="Yu Gothic UI Semibold" charset="-128"/>
             </a:endParaRPr>
           </a:p>
         </p:txBody>
@@ -20370,8 +20363,8 @@
                     <a:lumMod val="75000"/>
                   </a:schemeClr>
                 </a:solidFill>
-                <a:latin typeface="Arial" panose="020B0604020202020204" pitchFamily="34" charset="0"/>
-                <a:ea typeface="Arial" panose="020B0604020202020204" pitchFamily="34" charset="0"/>
+                <a:latin typeface="Arial" pitchFamily="34" charset="0"/>
+                <a:ea typeface="Arial" pitchFamily="34" charset="0"/>
                 <a:sym typeface="+mn-ea"/>
               </a:rPr>
               <a:t>Part 3</a:t>
@@ -20382,8 +20375,8 @@
                   <a:lumMod val="75000"/>
                 </a:schemeClr>
               </a:solidFill>
-              <a:latin typeface="Arial" panose="020B0604020202020204" pitchFamily="34" charset="0"/>
-              <a:ea typeface="Arial" panose="020B0604020202020204" pitchFamily="34" charset="0"/>
+              <a:latin typeface="Arial" pitchFamily="34" charset="0"/>
+              <a:ea typeface="Arial" pitchFamily="34" charset="0"/>
               <a:sym typeface="+mn-ea"/>
             </a:endParaRPr>
           </a:p>
@@ -20784,8 +20777,8 @@
                 <a:solidFill>
                   <a:schemeClr val="bg1"/>
                 </a:solidFill>
-                <a:latin typeface="Arial" panose="020B0604020202020204" pitchFamily="34" charset="0"/>
-                <a:ea typeface="Arial" panose="020B0604020202020204" pitchFamily="34" charset="0"/>
+                <a:latin typeface="Arial" pitchFamily="34" charset="0"/>
+                <a:ea typeface="Arial" pitchFamily="34" charset="0"/>
                 <a:sym typeface="+mn-ea"/>
               </a:rPr>
               <a:t> </a:t>
@@ -20795,8 +20788,8 @@
                 <a:solidFill>
                   <a:schemeClr val="bg1"/>
                 </a:solidFill>
-                <a:latin typeface="Arial" panose="020B0604020202020204" pitchFamily="34" charset="0"/>
-                <a:ea typeface="Arial" panose="020B0604020202020204" pitchFamily="34" charset="0"/>
+                <a:latin typeface="Arial" pitchFamily="34" charset="0"/>
+                <a:ea typeface="Arial" pitchFamily="34" charset="0"/>
                 <a:sym typeface="+mn-ea"/>
               </a:rPr>
               <a:t>YahBoom     </a:t>
@@ -20806,8 +20799,8 @@
                 <a:solidFill>
                   <a:schemeClr val="bg1"/>
                 </a:solidFill>
-                <a:latin typeface="微软雅黑" panose="020B0503020204020204" charset="-122"/>
-                <a:ea typeface="微软雅黑" panose="020B0503020204020204" charset="-122"/>
+                <a:latin typeface="微软雅黑" charset="-122"/>
+                <a:ea typeface="微软雅黑" charset="-122"/>
                 <a:sym typeface="+mn-ea"/>
               </a:rPr>
               <a:t>Croco:Kit </a:t>
@@ -20817,8 +20810,8 @@
                 <a:solidFill>
                   <a:schemeClr val="bg1"/>
                 </a:solidFill>
-                <a:latin typeface="Arial" panose="020B0604020202020204" pitchFamily="34" charset="0"/>
-                <a:ea typeface="Arial" panose="020B0604020202020204" pitchFamily="34" charset="0"/>
+                <a:latin typeface="Arial" pitchFamily="34" charset="0"/>
+                <a:ea typeface="Arial" pitchFamily="34" charset="0"/>
                 <a:sym typeface="+mn-ea"/>
               </a:rPr>
               <a:t>tutorial</a:t>
@@ -21078,8 +21071,8 @@
                     <a:lumMod val="75000"/>
                   </a:schemeClr>
                 </a:solidFill>
-                <a:latin typeface="Arial" panose="020B0604020202020204" pitchFamily="34" charset="0"/>
-                <a:ea typeface="Arial" panose="020B0604020202020204" pitchFamily="34" charset="0"/>
+                <a:latin typeface="Arial" pitchFamily="34" charset="0"/>
+                <a:ea typeface="Arial" pitchFamily="34" charset="0"/>
                 <a:sym typeface="+mn-ea"/>
               </a:rPr>
               <a:t>How to add YahBoom extension</a:t>
@@ -21091,8 +21084,8 @@
                     <a:lumMod val="75000"/>
                   </a:schemeClr>
                 </a:solidFill>
-                <a:latin typeface="Arial" panose="020B0604020202020204" pitchFamily="34" charset="0"/>
-                <a:ea typeface="Arial" panose="020B0604020202020204" pitchFamily="34" charset="0"/>
+                <a:latin typeface="Arial" pitchFamily="34" charset="0"/>
+                <a:ea typeface="Arial" pitchFamily="34" charset="0"/>
                 <a:sym typeface="+mn-ea"/>
               </a:rPr>
               <a:t> </a:t>
@@ -21103,8 +21096,8 @@
                   <a:lumMod val="75000"/>
                 </a:schemeClr>
               </a:solidFill>
-              <a:latin typeface="Arial" panose="020B0604020202020204" pitchFamily="34" charset="0"/>
-              <a:ea typeface="Arial" panose="020B0604020202020204" pitchFamily="34" charset="0"/>
+              <a:latin typeface="Arial" pitchFamily="34" charset="0"/>
+              <a:ea typeface="Arial" pitchFamily="34" charset="0"/>
               <a:sym typeface="+mn-ea"/>
             </a:endParaRPr>
           </a:p>
@@ -21143,8 +21136,8 @@
                     </a:srgbClr>
                   </a:outerShdw>
                 </a:effectLst>
-                <a:latin typeface="Arial" panose="020B0604020202020204" pitchFamily="34" charset="0"/>
-                <a:ea typeface="Arial" panose="020B0604020202020204" pitchFamily="34" charset="0"/>
+                <a:latin typeface="Arial" pitchFamily="34" charset="0"/>
+                <a:ea typeface="Arial" pitchFamily="34" charset="0"/>
               </a:rPr>
               <a:t>       Click Advanced,</a:t>
             </a:r>
@@ -21160,8 +21153,8 @@
                     </a:srgbClr>
                   </a:outerShdw>
                 </a:effectLst>
-                <a:latin typeface="Arial" panose="020B0604020202020204" pitchFamily="34" charset="0"/>
-                <a:ea typeface="Arial" panose="020B0604020202020204" pitchFamily="34" charset="0"/>
+                <a:latin typeface="Arial" pitchFamily="34" charset="0"/>
+                <a:ea typeface="Arial" pitchFamily="34" charset="0"/>
               </a:rPr>
               <a:t> </a:t>
             </a:r>
@@ -21177,8 +21170,8 @@
                     </a:srgbClr>
                   </a:outerShdw>
                 </a:effectLst>
-                <a:latin typeface="Arial" panose="020B0604020202020204" pitchFamily="34" charset="0"/>
-                <a:ea typeface="Arial" panose="020B0604020202020204" pitchFamily="34" charset="0"/>
+                <a:latin typeface="Arial" pitchFamily="34" charset="0"/>
+                <a:ea typeface="Arial" pitchFamily="34" charset="0"/>
               </a:rPr>
               <a:t>then Click Add Package</a:t>
             </a:r>
@@ -21193,8 +21186,8 @@
                   </a:srgbClr>
                 </a:outerShdw>
               </a:effectLst>
-              <a:latin typeface="Arial" panose="020B0604020202020204" pitchFamily="34" charset="0"/>
-              <a:ea typeface="Arial" panose="020B0604020202020204" pitchFamily="34" charset="0"/>
+              <a:latin typeface="Arial" pitchFamily="34" charset="0"/>
+              <a:ea typeface="Arial" pitchFamily="34" charset="0"/>
             </a:endParaRPr>
           </a:p>
         </p:txBody>
@@ -21260,28 +21253,28 @@
                 <a:solidFill>
                   <a:schemeClr val="bg1"/>
                 </a:solidFill>
-                <a:latin typeface="微软雅黑" panose="020B0503020204020204" charset="-122"/>
-                <a:ea typeface="微软雅黑" panose="020B0503020204020204" charset="-122"/>
+                <a:latin typeface="微软雅黑" charset="-122"/>
+                <a:ea typeface="微软雅黑" charset="-122"/>
               </a:rPr>
               <a:t>Preparation before class</a:t>
             </a:r>
             <a:r>
               <a:rPr lang="zh-CN" altLang="en-US" sz="2800" dirty="0">
                 <a:latin typeface="icomoon" charset="0"/>
-                <a:ea typeface="Yu Gothic UI Semibold" panose="020B0700000000000000" charset="-128"/>
+                <a:ea typeface="Yu Gothic UI Semibold" charset="-128"/>
               </a:rPr>
               <a:t>          </a:t>
             </a:r>
             <a:r>
               <a:rPr lang="zh-CN" altLang="en-US" sz="2800" u="sng" dirty="0">
                 <a:latin typeface="icomoon" charset="0"/>
-                <a:ea typeface="Yu Gothic UI Semibold" panose="020B0700000000000000" charset="-128"/>
+                <a:ea typeface="Yu Gothic UI Semibold" charset="-128"/>
               </a:rPr>
               <a:t>                     </a:t>
             </a:r>
             <a:endParaRPr lang="zh-CN" altLang="en-US" sz="2800" u="sng" dirty="0">
               <a:latin typeface="icomoon" charset="0"/>
-              <a:ea typeface="Yu Gothic UI Semibold" panose="020B0700000000000000" charset="-128"/>
+              <a:ea typeface="Yu Gothic UI Semibold" charset="-128"/>
             </a:endParaRPr>
           </a:p>
         </p:txBody>
@@ -21335,8 +21328,8 @@
                     <a:lumMod val="75000"/>
                   </a:schemeClr>
                 </a:solidFill>
-                <a:latin typeface="Arial" panose="020B0604020202020204" pitchFamily="34" charset="0"/>
-                <a:ea typeface="Arial" panose="020B0604020202020204" pitchFamily="34" charset="0"/>
+                <a:latin typeface="Arial" pitchFamily="34" charset="0"/>
+                <a:ea typeface="Arial" pitchFamily="34" charset="0"/>
                 <a:sym typeface="+mn-ea"/>
               </a:rPr>
               <a:t>Part 3</a:t>
@@ -21347,8 +21340,8 @@
                   <a:lumMod val="75000"/>
                 </a:schemeClr>
               </a:solidFill>
-              <a:latin typeface="Arial" panose="020B0604020202020204" pitchFamily="34" charset="0"/>
-              <a:ea typeface="Arial" panose="020B0604020202020204" pitchFamily="34" charset="0"/>
+              <a:latin typeface="Arial" pitchFamily="34" charset="0"/>
+              <a:ea typeface="Arial" pitchFamily="34" charset="0"/>
               <a:sym typeface="+mn-ea"/>
             </a:endParaRPr>
           </a:p>
@@ -21610,8 +21603,8 @@
                     </a:srgbClr>
                   </a:outerShdw>
                 </a:effectLst>
-                <a:latin typeface="Arial" panose="020B0604020202020204" pitchFamily="34" charset="0"/>
-                <a:ea typeface="Arial" panose="020B0604020202020204" pitchFamily="34" charset="0"/>
+                <a:latin typeface="Arial" pitchFamily="34" charset="0"/>
+                <a:ea typeface="Arial" pitchFamily="34" charset="0"/>
                 <a:sym typeface="+mn-ea"/>
               </a:rPr>
               <a:t>Enter the URL in the input column:</a:t>
@@ -21628,8 +21621,8 @@
                     </a:srgbClr>
                   </a:outerShdw>
                 </a:effectLst>
-                <a:latin typeface="Arial" panose="020B0604020202020204" pitchFamily="34" charset="0"/>
-                <a:ea typeface="Arial" panose="020B0604020202020204" pitchFamily="34" charset="0"/>
+                <a:latin typeface="Arial" pitchFamily="34" charset="0"/>
+                <a:ea typeface="Arial" pitchFamily="34" charset="0"/>
                 <a:sym typeface="+mn-ea"/>
               </a:rPr>
               <a:t>https://github.com/lzty634158/Croco-Kit</a:t>
@@ -21646,8 +21639,8 @@
                     </a:srgbClr>
                   </a:outerShdw>
                 </a:effectLst>
-                <a:latin typeface="Arial" panose="020B0604020202020204" pitchFamily="34" charset="0"/>
-                <a:ea typeface="Arial" panose="020B0604020202020204" pitchFamily="34" charset="0"/>
+                <a:latin typeface="Arial" pitchFamily="34" charset="0"/>
+                <a:ea typeface="Arial" pitchFamily="34" charset="0"/>
                 <a:sym typeface="+mn-ea"/>
               </a:rPr>
               <a:t>.</a:t>
@@ -21663,8 +21656,8 @@
                   </a:srgbClr>
                 </a:outerShdw>
               </a:effectLst>
-              <a:latin typeface="Arial" panose="020B0604020202020204" pitchFamily="34" charset="0"/>
-              <a:ea typeface="Arial" panose="020B0604020202020204" pitchFamily="34" charset="0"/>
+              <a:latin typeface="Arial" pitchFamily="34" charset="0"/>
+              <a:ea typeface="Arial" pitchFamily="34" charset="0"/>
               <a:sym typeface="+mn-ea"/>
             </a:endParaRPr>
           </a:p>
@@ -21681,8 +21674,8 @@
                     </a:srgbClr>
                   </a:outerShdw>
                 </a:effectLst>
-                <a:latin typeface="Arial" panose="020B0604020202020204" pitchFamily="34" charset="0"/>
-                <a:ea typeface="Arial" panose="020B0604020202020204" pitchFamily="34" charset="0"/>
+                <a:latin typeface="Arial" pitchFamily="34" charset="0"/>
+                <a:ea typeface="Arial" pitchFamily="34" charset="0"/>
               </a:rPr>
               <a:t>Then</a:t>
             </a:r>
@@ -21698,8 +21691,8 @@
                     </a:srgbClr>
                   </a:outerShdw>
                 </a:effectLst>
-                <a:latin typeface="Arial" panose="020B0604020202020204" pitchFamily="34" charset="0"/>
-                <a:ea typeface="Arial" panose="020B0604020202020204" pitchFamily="34" charset="0"/>
+                <a:latin typeface="Arial" pitchFamily="34" charset="0"/>
+                <a:ea typeface="Arial" pitchFamily="34" charset="0"/>
               </a:rPr>
               <a:t>,we need to search or press “</a:t>
             </a:r>
@@ -21715,8 +21708,8 @@
                     </a:srgbClr>
                   </a:outerShdw>
                 </a:effectLst>
-                <a:latin typeface="Arial" panose="020B0604020202020204" pitchFamily="34" charset="0"/>
-                <a:ea typeface="Arial" panose="020B0604020202020204" pitchFamily="34" charset="0"/>
+                <a:latin typeface="Arial" pitchFamily="34" charset="0"/>
+                <a:ea typeface="Arial" pitchFamily="34" charset="0"/>
               </a:rPr>
               <a:t>Enter</a:t>
             </a:r>
@@ -21732,8 +21725,8 @@
                     </a:srgbClr>
                   </a:outerShdw>
                 </a:effectLst>
-                <a:latin typeface="Arial" panose="020B0604020202020204" pitchFamily="34" charset="0"/>
-                <a:ea typeface="Arial" panose="020B0604020202020204" pitchFamily="34" charset="0"/>
+                <a:latin typeface="Arial" pitchFamily="34" charset="0"/>
+                <a:ea typeface="Arial" pitchFamily="34" charset="0"/>
               </a:rPr>
               <a:t>” key on the keyboard.</a:t>
             </a:r>
@@ -21748,8 +21741,8 @@
                   </a:srgbClr>
                 </a:outerShdw>
               </a:effectLst>
-              <a:latin typeface="Arial" panose="020B0604020202020204" pitchFamily="34" charset="0"/>
-              <a:ea typeface="Arial" panose="020B0604020202020204" pitchFamily="34" charset="0"/>
+              <a:latin typeface="Arial" pitchFamily="34" charset="0"/>
+              <a:ea typeface="Arial" pitchFamily="34" charset="0"/>
             </a:endParaRPr>
           </a:p>
         </p:txBody>
@@ -22149,8 +22142,8 @@
                 <a:solidFill>
                   <a:schemeClr val="bg1"/>
                 </a:solidFill>
-                <a:latin typeface="Arial" panose="020B0604020202020204" pitchFamily="34" charset="0"/>
-                <a:ea typeface="Arial" panose="020B0604020202020204" pitchFamily="34" charset="0"/>
+                <a:latin typeface="Arial" pitchFamily="34" charset="0"/>
+                <a:ea typeface="Arial" pitchFamily="34" charset="0"/>
                 <a:sym typeface="+mn-ea"/>
               </a:rPr>
               <a:t> </a:t>
@@ -22160,8 +22153,8 @@
                 <a:solidFill>
                   <a:schemeClr val="bg1"/>
                 </a:solidFill>
-                <a:latin typeface="Arial" panose="020B0604020202020204" pitchFamily="34" charset="0"/>
-                <a:ea typeface="Arial" panose="020B0604020202020204" pitchFamily="34" charset="0"/>
+                <a:latin typeface="Arial" pitchFamily="34" charset="0"/>
+                <a:ea typeface="Arial" pitchFamily="34" charset="0"/>
                 <a:sym typeface="+mn-ea"/>
               </a:rPr>
               <a:t>YahBoom     </a:t>
@@ -22171,8 +22164,8 @@
                 <a:solidFill>
                   <a:schemeClr val="bg1"/>
                 </a:solidFill>
-                <a:latin typeface="微软雅黑" panose="020B0503020204020204" charset="-122"/>
-                <a:ea typeface="微软雅黑" panose="020B0503020204020204" charset="-122"/>
+                <a:latin typeface="微软雅黑" charset="-122"/>
+                <a:ea typeface="微软雅黑" charset="-122"/>
                 <a:sym typeface="+mn-ea"/>
               </a:rPr>
               <a:t>Croco:Kit </a:t>
@@ -22182,8 +22175,8 @@
                 <a:solidFill>
                   <a:schemeClr val="bg1"/>
                 </a:solidFill>
-                <a:latin typeface="Arial" panose="020B0604020202020204" pitchFamily="34" charset="0"/>
-                <a:ea typeface="Arial" panose="020B0604020202020204" pitchFamily="34" charset="0"/>
+                <a:latin typeface="Arial" pitchFamily="34" charset="0"/>
+                <a:ea typeface="Arial" pitchFamily="34" charset="0"/>
                 <a:sym typeface="+mn-ea"/>
               </a:rPr>
               <a:t>tutorial</a:t>
@@ -22220,8 +22213,8 @@
                     <a:lumMod val="75000"/>
                   </a:schemeClr>
                 </a:solidFill>
-                <a:latin typeface="Arial" panose="020B0604020202020204" pitchFamily="34" charset="0"/>
-                <a:ea typeface="Arial" panose="020B0604020202020204" pitchFamily="34" charset="0"/>
+                <a:latin typeface="Arial" pitchFamily="34" charset="0"/>
+                <a:ea typeface="Arial" pitchFamily="34" charset="0"/>
                 <a:sym typeface="+mn-ea"/>
               </a:rPr>
               <a:t>How to add YahBoom extension</a:t>
@@ -22233,8 +22226,8 @@
                     <a:lumMod val="75000"/>
                   </a:schemeClr>
                 </a:solidFill>
-                <a:latin typeface="Arial" panose="020B0604020202020204" pitchFamily="34" charset="0"/>
-                <a:ea typeface="Arial" panose="020B0604020202020204" pitchFamily="34" charset="0"/>
+                <a:latin typeface="Arial" pitchFamily="34" charset="0"/>
+                <a:ea typeface="Arial" pitchFamily="34" charset="0"/>
                 <a:sym typeface="+mn-ea"/>
               </a:rPr>
               <a:t> </a:t>
@@ -22245,8 +22238,8 @@
                   <a:lumMod val="75000"/>
                 </a:schemeClr>
               </a:solidFill>
-              <a:latin typeface="Arial" panose="020B0604020202020204" pitchFamily="34" charset="0"/>
-              <a:ea typeface="Arial" panose="020B0604020202020204" pitchFamily="34" charset="0"/>
+              <a:latin typeface="Arial" pitchFamily="34" charset="0"/>
+              <a:ea typeface="Arial" pitchFamily="34" charset="0"/>
               <a:sym typeface="+mn-ea"/>
             </a:endParaRPr>
           </a:p>
@@ -22289,28 +22282,28 @@
                 <a:solidFill>
                   <a:schemeClr val="bg1"/>
                 </a:solidFill>
-                <a:latin typeface="微软雅黑" panose="020B0503020204020204" charset="-122"/>
-                <a:ea typeface="微软雅黑" panose="020B0503020204020204" charset="-122"/>
+                <a:latin typeface="微软雅黑" charset="-122"/>
+                <a:ea typeface="微软雅黑" charset="-122"/>
               </a:rPr>
               <a:t>Preparation before class</a:t>
             </a:r>
             <a:r>
               <a:rPr lang="zh-CN" altLang="en-US" sz="2800" dirty="0">
                 <a:latin typeface="icomoon" charset="0"/>
-                <a:ea typeface="Yu Gothic UI Semibold" panose="020B0700000000000000" charset="-128"/>
+                <a:ea typeface="Yu Gothic UI Semibold" charset="-128"/>
               </a:rPr>
               <a:t>          </a:t>
             </a:r>
             <a:r>
               <a:rPr lang="zh-CN" altLang="en-US" sz="2800" u="sng" dirty="0">
                 <a:latin typeface="icomoon" charset="0"/>
-                <a:ea typeface="Yu Gothic UI Semibold" panose="020B0700000000000000" charset="-128"/>
+                <a:ea typeface="Yu Gothic UI Semibold" charset="-128"/>
               </a:rPr>
               <a:t>                     </a:t>
             </a:r>
             <a:endParaRPr lang="zh-CN" altLang="en-US" sz="2800" u="sng" dirty="0">
               <a:latin typeface="icomoon" charset="0"/>
-              <a:ea typeface="Yu Gothic UI Semibold" panose="020B0700000000000000" charset="-128"/>
+              <a:ea typeface="Yu Gothic UI Semibold" charset="-128"/>
             </a:endParaRPr>
           </a:p>
         </p:txBody>
@@ -22541,6 +22534,8 @@
       </a:bgFillStyleLst>
     </a:fmtScheme>
   </a:themeElements>
+  <a:objectDefaults/>
+  <a:extraClrSchemeLst/>
   <a:extLst>
     <a:ext uri="{05A4C25C-085E-4340-85A3-A5531E510DB2}">
       <thm15:themeFamily xmlns:thm15="http://schemas.microsoft.com/office/thememl/2012/main" name="Office Theme" id="{62F939B6-93AF-4DB8-9C6B-D6C7DFDC589F}" vid="{4A3C46E8-61CC-4603-A589-7422A47A8E4A}"/>
@@ -22800,6 +22795,8 @@
       </a:bgFillStyleLst>
     </a:fmtScheme>
   </a:themeElements>
+  <a:objectDefaults/>
+  <a:extraClrSchemeLst/>
   <a:extLst>
     <a:ext uri="{05A4C25C-085E-4340-85A3-A5531E510DB2}">
       <thm15:themeFamily xmlns:thm15="http://schemas.microsoft.com/office/thememl/2012/main" name="Office Theme" id="{62F939B6-93AF-4DB8-9C6B-D6C7DFDC589F}" vid="{4A3C46E8-61CC-4603-A589-7422A47A8E4A}"/>
@@ -23059,6 +23056,8 @@
       </a:bgFillStyleLst>
     </a:fmtScheme>
   </a:themeElements>
+  <a:objectDefaults/>
+  <a:extraClrSchemeLst/>
   <a:extLst>
     <a:ext uri="{05A4C25C-085E-4340-85A3-A5531E510DB2}">
       <thm15:themeFamily xmlns:thm15="http://schemas.microsoft.com/office/thememl/2012/main" name="Office Theme" id="{62F939B6-93AF-4DB8-9C6B-D6C7DFDC589F}" vid="{4A3C46E8-61CC-4603-A589-7422A47A8E4A}"/>

</xml_diff>